<commit_message>
Ben - July 24th
Adding the Final presentation
</commit_message>
<xml_diff>
--- a/Dev/Ben/Ben_Machine_Learning_Slides.pptx
+++ b/Dev/Ben/Ben_Machine_Learning_Slides.pptx
@@ -9,7 +9,9 @@
     <p:sldId id="258" r:id="rId3"/>
     <p:sldId id="260" r:id="rId4"/>
     <p:sldId id="266" r:id="rId5"/>
-    <p:sldId id="270" r:id="rId6"/>
+    <p:sldId id="271" r:id="rId6"/>
+    <p:sldId id="270" r:id="rId7"/>
+    <p:sldId id="272" r:id="rId8"/>
   </p:sldIdLst>
   <p:sldSz cx="12192000" cy="6858000"/>
   <p:notesSz cx="6858000" cy="9144000"/>
@@ -120,7 +122,7 @@
 <p1510:revInfo xmlns:a="http://schemas.openxmlformats.org/drawingml/2006/main" xmlns:r="http://schemas.openxmlformats.org/officeDocument/2006/relationships" xmlns:p1510="http://schemas.microsoft.com/office/powerpoint/2015/10/main">
   <p1510:revLst>
     <p1510:client id="{3A7A832D-5E3D-444C-A01F-54A9E6992541}" v="122" dt="2020-07-24T02:23:49.674"/>
-    <p1510:client id="{FED6C4F5-8304-439D-91CC-702946B2ECD6}" v="18" dt="2020-07-24T04:11:02.167"/>
+    <p1510:client id="{FED6C4F5-8304-439D-91CC-702946B2ECD6}" v="34" dt="2020-07-24T21:09:25.046"/>
   </p1510:revLst>
 </p1510:revInfo>
 </file>
@@ -129,8 +131,8 @@
 <pc:chgInfo xmlns:a="http://schemas.openxmlformats.org/drawingml/2006/main" xmlns:r="http://schemas.openxmlformats.org/officeDocument/2006/relationships" xmlns:ac="http://schemas.microsoft.com/office/drawing/2013/main/command" xmlns:pc="http://schemas.microsoft.com/office/powerpoint/2013/main/command">
   <pc:docChgLst>
     <pc:chgData name="Benjamin AUBRY" userId="3378e7d37fbb753c" providerId="LiveId" clId="{FED6C4F5-8304-439D-91CC-702946B2ECD6}"/>
-    <pc:docChg chg="undo custSel addSld delSld modSld">
-      <pc:chgData name="Benjamin AUBRY" userId="3378e7d37fbb753c" providerId="LiveId" clId="{FED6C4F5-8304-439D-91CC-702946B2ECD6}" dt="2020-07-24T04:31:30.109" v="1843" actId="1076"/>
+    <pc:docChg chg="undo custSel addSld delSld modSld sldOrd">
+      <pc:chgData name="Benjamin AUBRY" userId="3378e7d37fbb753c" providerId="LiveId" clId="{FED6C4F5-8304-439D-91CC-702946B2ECD6}" dt="2020-07-24T21:26:27.446" v="5923" actId="1076"/>
       <pc:docMkLst>
         <pc:docMk/>
       </pc:docMkLst>
@@ -165,7 +167,7 @@
         </pc:sldMkLst>
       </pc:sldChg>
       <pc:sldChg chg="addSp modSp mod">
-        <pc:chgData name="Benjamin AUBRY" userId="3378e7d37fbb753c" providerId="LiveId" clId="{FED6C4F5-8304-439D-91CC-702946B2ECD6}" dt="2020-07-24T04:08:43.895" v="1437" actId="20577"/>
+        <pc:chgData name="Benjamin AUBRY" userId="3378e7d37fbb753c" providerId="LiveId" clId="{FED6C4F5-8304-439D-91CC-702946B2ECD6}" dt="2020-07-24T21:26:27.446" v="5923" actId="1076"/>
         <pc:sldMkLst>
           <pc:docMk/>
           <pc:sldMk cId="1795393081" sldId="258"/>
@@ -179,7 +181,7 @@
           </ac:spMkLst>
         </pc:spChg>
         <pc:spChg chg="mod">
-          <ac:chgData name="Benjamin AUBRY" userId="3378e7d37fbb753c" providerId="LiveId" clId="{FED6C4F5-8304-439D-91CC-702946B2ECD6}" dt="2020-07-24T04:08:43.895" v="1437" actId="20577"/>
+          <ac:chgData name="Benjamin AUBRY" userId="3378e7d37fbb753c" providerId="LiveId" clId="{FED6C4F5-8304-439D-91CC-702946B2ECD6}" dt="2020-07-24T21:26:23.081" v="5922" actId="255"/>
           <ac:spMkLst>
             <pc:docMk/>
             <pc:sldMk cId="1795393081" sldId="258"/>
@@ -187,7 +189,7 @@
           </ac:spMkLst>
         </pc:spChg>
         <pc:picChg chg="add mod">
-          <ac:chgData name="Benjamin AUBRY" userId="3378e7d37fbb753c" providerId="LiveId" clId="{FED6C4F5-8304-439D-91CC-702946B2ECD6}" dt="2020-07-24T03:41:31.640" v="1098" actId="14100"/>
+          <ac:chgData name="Benjamin AUBRY" userId="3378e7d37fbb753c" providerId="LiveId" clId="{FED6C4F5-8304-439D-91CC-702946B2ECD6}" dt="2020-07-24T21:26:27.446" v="5923" actId="1076"/>
           <ac:picMkLst>
             <pc:docMk/>
             <pc:sldMk cId="1795393081" sldId="258"/>
@@ -277,7 +279,7 @@
         </pc:sldMkLst>
       </pc:sldChg>
       <pc:sldChg chg="addSp delSp modSp mod">
-        <pc:chgData name="Benjamin AUBRY" userId="3378e7d37fbb753c" providerId="LiveId" clId="{FED6C4F5-8304-439D-91CC-702946B2ECD6}" dt="2020-07-24T04:17:13.462" v="1833" actId="20577"/>
+        <pc:chgData name="Benjamin AUBRY" userId="3378e7d37fbb753c" providerId="LiveId" clId="{FED6C4F5-8304-439D-91CC-702946B2ECD6}" dt="2020-07-24T20:22:38.696" v="3189" actId="14100"/>
         <pc:sldMkLst>
           <pc:docMk/>
           <pc:sldMk cId="3152759760" sldId="266"/>
@@ -291,11 +293,27 @@
           </ac:spMkLst>
         </pc:spChg>
         <pc:spChg chg="mod">
-          <ac:chgData name="Benjamin AUBRY" userId="3378e7d37fbb753c" providerId="LiveId" clId="{FED6C4F5-8304-439D-91CC-702946B2ECD6}" dt="2020-07-24T04:14:13.579" v="1815" actId="255"/>
+          <ac:chgData name="Benjamin AUBRY" userId="3378e7d37fbb753c" providerId="LiveId" clId="{FED6C4F5-8304-439D-91CC-702946B2ECD6}" dt="2020-07-24T18:03:20.600" v="2179" actId="20577"/>
           <ac:spMkLst>
             <pc:docMk/>
             <pc:sldMk cId="3152759760" sldId="266"/>
             <ac:spMk id="3" creationId="{F9373776-0793-4E8F-8A90-8AA6FCB16820}"/>
+          </ac:spMkLst>
+        </pc:spChg>
+        <pc:spChg chg="add mod">
+          <ac:chgData name="Benjamin AUBRY" userId="3378e7d37fbb753c" providerId="LiveId" clId="{FED6C4F5-8304-439D-91CC-702946B2ECD6}" dt="2020-07-24T18:48:24.668" v="2533" actId="1076"/>
+          <ac:spMkLst>
+            <pc:docMk/>
+            <pc:sldMk cId="3152759760" sldId="266"/>
+            <ac:spMk id="4" creationId="{C540351B-CB3D-4DBF-9D25-8ECDB1082A2E}"/>
+          </ac:spMkLst>
+        </pc:spChg>
+        <pc:spChg chg="add del mod">
+          <ac:chgData name="Benjamin AUBRY" userId="3378e7d37fbb753c" providerId="LiveId" clId="{FED6C4F5-8304-439D-91CC-702946B2ECD6}" dt="2020-07-24T18:34:13.995" v="2295"/>
+          <ac:spMkLst>
+            <pc:docMk/>
+            <pc:sldMk cId="3152759760" sldId="266"/>
+            <ac:spMk id="5" creationId="{5BC5C608-A33D-4A07-BCC2-56E8B29FD073}"/>
           </ac:spMkLst>
         </pc:spChg>
         <pc:spChg chg="del">
@@ -306,12 +324,20 @@
             <ac:spMk id="5" creationId="{78F8A06F-C846-4811-B309-D744A442F491}"/>
           </ac:spMkLst>
         </pc:spChg>
-        <pc:spChg chg="mod">
-          <ac:chgData name="Benjamin AUBRY" userId="3378e7d37fbb753c" providerId="LiveId" clId="{FED6C4F5-8304-439D-91CC-702946B2ECD6}" dt="2020-07-24T04:14:20.250" v="1816" actId="255"/>
+        <pc:spChg chg="del mod">
+          <ac:chgData name="Benjamin AUBRY" userId="3378e7d37fbb753c" providerId="LiveId" clId="{FED6C4F5-8304-439D-91CC-702946B2ECD6}" dt="2020-07-24T17:39:07.209" v="2121" actId="478"/>
           <ac:spMkLst>
             <pc:docMk/>
             <pc:sldMk cId="3152759760" sldId="266"/>
             <ac:spMk id="6" creationId="{2020A30A-9B34-41E1-BC16-C63E14B7465E}"/>
+          </ac:spMkLst>
+        </pc:spChg>
+        <pc:spChg chg="add mod">
+          <ac:chgData name="Benjamin AUBRY" userId="3378e7d37fbb753c" providerId="LiveId" clId="{FED6C4F5-8304-439D-91CC-702946B2ECD6}" dt="2020-07-24T20:22:38.696" v="3189" actId="14100"/>
+          <ac:spMkLst>
+            <pc:docMk/>
+            <pc:sldMk cId="3152759760" sldId="266"/>
+            <ac:spMk id="7" creationId="{04B0DE22-D164-4A6D-BEDC-D57B6C5485C9}"/>
           </ac:spMkLst>
         </pc:spChg>
         <pc:spChg chg="del mod">
@@ -322,12 +348,28 @@
             <ac:spMk id="7" creationId="{C2E4C8B5-DE8E-499C-A22D-F9D3B49F6F33}"/>
           </ac:spMkLst>
         </pc:spChg>
+        <pc:spChg chg="add del mod">
+          <ac:chgData name="Benjamin AUBRY" userId="3378e7d37fbb753c" providerId="LiveId" clId="{FED6C4F5-8304-439D-91CC-702946B2ECD6}" dt="2020-07-24T17:30:34.465" v="1951" actId="478"/>
+          <ac:spMkLst>
+            <pc:docMk/>
+            <pc:sldMk cId="3152759760" sldId="266"/>
+            <ac:spMk id="9" creationId="{1A29AA1D-6C05-4328-97A7-77D8E53CF0EE}"/>
+          </ac:spMkLst>
+        </pc:spChg>
         <pc:spChg chg="del mod">
           <ac:chgData name="Benjamin AUBRY" userId="3378e7d37fbb753c" providerId="LiveId" clId="{FED6C4F5-8304-439D-91CC-702946B2ECD6}" dt="2020-07-24T03:25:06.893" v="529" actId="478"/>
           <ac:spMkLst>
             <pc:docMk/>
             <pc:sldMk cId="3152759760" sldId="266"/>
             <ac:spMk id="9" creationId="{681F1E79-86BF-4ACD-A874-DD1C6B57A875}"/>
+          </ac:spMkLst>
+        </pc:spChg>
+        <pc:spChg chg="add del mod">
+          <ac:chgData name="Benjamin AUBRY" userId="3378e7d37fbb753c" providerId="LiveId" clId="{FED6C4F5-8304-439D-91CC-702946B2ECD6}" dt="2020-07-24T17:30:47.227" v="1954" actId="478"/>
+          <ac:spMkLst>
+            <pc:docMk/>
+            <pc:sldMk cId="3152759760" sldId="266"/>
+            <ac:spMk id="10" creationId="{568AC912-0023-49A1-BE7C-1196A9CB1978}"/>
           </ac:spMkLst>
         </pc:spChg>
         <pc:spChg chg="del">
@@ -362,8 +404,8 @@
             <ac:picMk id="11" creationId="{58F20622-CC5D-4259-A437-20BE52792CF7}"/>
           </ac:picMkLst>
         </pc:picChg>
-        <pc:picChg chg="add mod">
-          <ac:chgData name="Benjamin AUBRY" userId="3378e7d37fbb753c" providerId="LiveId" clId="{FED6C4F5-8304-439D-91CC-702946B2ECD6}" dt="2020-07-24T03:45:40.465" v="1187" actId="1076"/>
+        <pc:picChg chg="add del mod">
+          <ac:chgData name="Benjamin AUBRY" userId="3378e7d37fbb753c" providerId="LiveId" clId="{FED6C4F5-8304-439D-91CC-702946B2ECD6}" dt="2020-07-24T17:39:03.017" v="2119" actId="478"/>
           <ac:picMkLst>
             <pc:docMk/>
             <pc:sldMk cId="3152759760" sldId="266"/>
@@ -386,8 +428,8 @@
             <ac:picMk id="15" creationId="{AE74CA69-870A-4D04-A871-11E9BE0EE60F}"/>
           </ac:picMkLst>
         </pc:picChg>
-        <pc:picChg chg="add mod">
-          <ac:chgData name="Benjamin AUBRY" userId="3378e7d37fbb753c" providerId="LiveId" clId="{FED6C4F5-8304-439D-91CC-702946B2ECD6}" dt="2020-07-24T03:46:15.529" v="1191" actId="1038"/>
+        <pc:picChg chg="add del mod">
+          <ac:chgData name="Benjamin AUBRY" userId="3378e7d37fbb753c" providerId="LiveId" clId="{FED6C4F5-8304-439D-91CC-702946B2ECD6}" dt="2020-07-24T17:39:05.177" v="2120" actId="478"/>
           <ac:picMkLst>
             <pc:docMk/>
             <pc:sldMk cId="3152759760" sldId="266"/>
@@ -395,7 +437,7 @@
           </ac:picMkLst>
         </pc:picChg>
         <pc:picChg chg="add mod">
-          <ac:chgData name="Benjamin AUBRY" userId="3378e7d37fbb753c" providerId="LiveId" clId="{FED6C4F5-8304-439D-91CC-702946B2ECD6}" dt="2020-07-24T03:49:37.112" v="1308" actId="14100"/>
+          <ac:chgData name="Benjamin AUBRY" userId="3378e7d37fbb753c" providerId="LiveId" clId="{FED6C4F5-8304-439D-91CC-702946B2ECD6}" dt="2020-07-24T17:39:14.809" v="2136" actId="1036"/>
           <ac:picMkLst>
             <pc:docMk/>
             <pc:sldMk cId="3152759760" sldId="266"/>
@@ -410,8 +452,8 @@
             <ac:picMk id="22" creationId="{E7F3EC74-9DC9-4E45-BC7F-16C5A11CFB37}"/>
           </ac:picMkLst>
         </pc:picChg>
-        <pc:picChg chg="add mod">
-          <ac:chgData name="Benjamin AUBRY" userId="3378e7d37fbb753c" providerId="LiveId" clId="{FED6C4F5-8304-439D-91CC-702946B2ECD6}" dt="2020-07-24T03:53:52.752" v="1317" actId="1076"/>
+        <pc:picChg chg="add del mod">
+          <ac:chgData name="Benjamin AUBRY" userId="3378e7d37fbb753c" providerId="LiveId" clId="{FED6C4F5-8304-439D-91CC-702946B2ECD6}" dt="2020-07-24T19:51:20.575" v="3081" actId="478"/>
           <ac:picMkLst>
             <pc:docMk/>
             <pc:sldMk cId="3152759760" sldId="266"/>
@@ -449,13 +491,13 @@
         </pc:sldMkLst>
       </pc:sldChg>
       <pc:sldChg chg="addSp delSp modSp add mod">
-        <pc:chgData name="Benjamin AUBRY" userId="3378e7d37fbb753c" providerId="LiveId" clId="{FED6C4F5-8304-439D-91CC-702946B2ECD6}" dt="2020-07-24T04:31:30.109" v="1843" actId="1076"/>
+        <pc:chgData name="Benjamin AUBRY" userId="3378e7d37fbb753c" providerId="LiveId" clId="{FED6C4F5-8304-439D-91CC-702946B2ECD6}" dt="2020-07-24T21:20:41.689" v="5157" actId="20577"/>
         <pc:sldMkLst>
           <pc:docMk/>
           <pc:sldMk cId="3527227421" sldId="270"/>
         </pc:sldMkLst>
         <pc:spChg chg="mod">
-          <ac:chgData name="Benjamin AUBRY" userId="3378e7d37fbb753c" providerId="LiveId" clId="{FED6C4F5-8304-439D-91CC-702946B2ECD6}" dt="2020-07-24T04:06:03.191" v="1381" actId="20577"/>
+          <ac:chgData name="Benjamin AUBRY" userId="3378e7d37fbb753c" providerId="LiveId" clId="{FED6C4F5-8304-439D-91CC-702946B2ECD6}" dt="2020-07-24T17:26:40.744" v="1889" actId="20577"/>
           <ac:spMkLst>
             <pc:docMk/>
             <pc:sldMk cId="3527227421" sldId="270"/>
@@ -463,15 +505,15 @@
           </ac:spMkLst>
         </pc:spChg>
         <pc:spChg chg="mod">
-          <ac:chgData name="Benjamin AUBRY" userId="3378e7d37fbb753c" providerId="LiveId" clId="{FED6C4F5-8304-439D-91CC-702946B2ECD6}" dt="2020-07-24T04:25:37.912" v="1838" actId="20577"/>
+          <ac:chgData name="Benjamin AUBRY" userId="3378e7d37fbb753c" providerId="LiveId" clId="{FED6C4F5-8304-439D-91CC-702946B2ECD6}" dt="2020-07-24T20:57:26.645" v="3696"/>
           <ac:spMkLst>
             <pc:docMk/>
             <pc:sldMk cId="3527227421" sldId="270"/>
             <ac:spMk id="3" creationId="{F9373776-0793-4E8F-8A90-8AA6FCB16820}"/>
           </ac:spMkLst>
         </pc:spChg>
-        <pc:spChg chg="add mod">
-          <ac:chgData name="Benjamin AUBRY" userId="3378e7d37fbb753c" providerId="LiveId" clId="{FED6C4F5-8304-439D-91CC-702946B2ECD6}" dt="2020-07-24T04:09:38.819" v="1438" actId="1076"/>
+        <pc:spChg chg="add del mod">
+          <ac:chgData name="Benjamin AUBRY" userId="3378e7d37fbb753c" providerId="LiveId" clId="{FED6C4F5-8304-439D-91CC-702946B2ECD6}" dt="2020-07-24T20:32:32.322" v="3446"/>
           <ac:spMkLst>
             <pc:docMk/>
             <pc:sldMk cId="3527227421" sldId="270"/>
@@ -486,6 +528,22 @@
             <ac:spMk id="6" creationId="{2020A30A-9B34-41E1-BC16-C63E14B7465E}"/>
           </ac:spMkLst>
         </pc:spChg>
+        <pc:spChg chg="add mod">
+          <ac:chgData name="Benjamin AUBRY" userId="3378e7d37fbb753c" providerId="LiveId" clId="{FED6C4F5-8304-439D-91CC-702946B2ECD6}" dt="2020-07-24T21:20:41.689" v="5157" actId="20577"/>
+          <ac:spMkLst>
+            <pc:docMk/>
+            <pc:sldMk cId="3527227421" sldId="270"/>
+            <ac:spMk id="13" creationId="{B8A2AD42-9E31-4716-9974-A678E4536246}"/>
+          </ac:spMkLst>
+        </pc:spChg>
+        <pc:spChg chg="add mod">
+          <ac:chgData name="Benjamin AUBRY" userId="3378e7d37fbb753c" providerId="LiveId" clId="{FED6C4F5-8304-439D-91CC-702946B2ECD6}" dt="2020-07-24T21:00:09.704" v="3981" actId="1076"/>
+          <ac:spMkLst>
+            <pc:docMk/>
+            <pc:sldMk cId="3527227421" sldId="270"/>
+            <ac:spMk id="15" creationId="{5D5A3701-BBC7-485D-BC4F-9DF688B2D880}"/>
+          </ac:spMkLst>
+        </pc:spChg>
         <pc:picChg chg="add mod">
           <ac:chgData name="Benjamin AUBRY" userId="3378e7d37fbb753c" providerId="LiveId" clId="{FED6C4F5-8304-439D-91CC-702946B2ECD6}" dt="2020-07-24T04:10:57.535" v="1593" actId="14100"/>
           <ac:picMkLst>
@@ -495,7 +553,15 @@
           </ac:picMkLst>
         </pc:picChg>
         <pc:picChg chg="add mod">
-          <ac:chgData name="Benjamin AUBRY" userId="3378e7d37fbb753c" providerId="LiveId" clId="{FED6C4F5-8304-439D-91CC-702946B2ECD6}" dt="2020-07-24T04:31:27.548" v="1842" actId="1076"/>
+          <ac:chgData name="Benjamin AUBRY" userId="3378e7d37fbb753c" providerId="LiveId" clId="{FED6C4F5-8304-439D-91CC-702946B2ECD6}" dt="2020-07-24T20:53:33.482" v="3468" actId="14100"/>
+          <ac:picMkLst>
+            <pc:docMk/>
+            <pc:sldMk cId="3527227421" sldId="270"/>
+            <ac:picMk id="7" creationId="{57856F3C-D390-4E0D-B885-AC7C59766801}"/>
+          </ac:picMkLst>
+        </pc:picChg>
+        <pc:picChg chg="add del mod">
+          <ac:chgData name="Benjamin AUBRY" userId="3378e7d37fbb753c" providerId="LiveId" clId="{FED6C4F5-8304-439D-91CC-702946B2ECD6}" dt="2020-07-24T20:32:32.318" v="3444" actId="478"/>
           <ac:picMkLst>
             <pc:docMk/>
             <pc:sldMk cId="3527227421" sldId="270"/>
@@ -503,7 +569,15 @@
           </ac:picMkLst>
         </pc:picChg>
         <pc:picChg chg="add mod">
-          <ac:chgData name="Benjamin AUBRY" userId="3378e7d37fbb753c" providerId="LiveId" clId="{FED6C4F5-8304-439D-91CC-702946B2ECD6}" dt="2020-07-24T04:31:30.109" v="1843" actId="1076"/>
+          <ac:chgData name="Benjamin AUBRY" userId="3378e7d37fbb753c" providerId="LiveId" clId="{FED6C4F5-8304-439D-91CC-702946B2ECD6}" dt="2020-07-24T20:53:25.769" v="3464" actId="14100"/>
+          <ac:picMkLst>
+            <pc:docMk/>
+            <pc:sldMk cId="3527227421" sldId="270"/>
+            <ac:picMk id="10" creationId="{B38C006F-E9C0-4306-B266-A8FD4DDAC241}"/>
+          </ac:picMkLst>
+        </pc:picChg>
+        <pc:picChg chg="add del mod">
+          <ac:chgData name="Benjamin AUBRY" userId="3378e7d37fbb753c" providerId="LiveId" clId="{FED6C4F5-8304-439D-91CC-702946B2ECD6}" dt="2020-07-24T20:32:34.059" v="3447" actId="478"/>
           <ac:picMkLst>
             <pc:docMk/>
             <pc:sldMk cId="3527227421" sldId="270"/>
@@ -516,6 +590,14 @@
             <pc:docMk/>
             <pc:sldMk cId="3527227421" sldId="270"/>
             <ac:picMk id="12" creationId="{81198145-7DF1-420D-9878-4B4E45C7CC52}"/>
+          </ac:picMkLst>
+        </pc:picChg>
+        <pc:picChg chg="add mod">
+          <ac:chgData name="Benjamin AUBRY" userId="3378e7d37fbb753c" providerId="LiveId" clId="{FED6C4F5-8304-439D-91CC-702946B2ECD6}" dt="2020-07-24T21:08:33.953" v="4141" actId="14100"/>
+          <ac:picMkLst>
+            <pc:docMk/>
+            <pc:sldMk cId="3527227421" sldId="270"/>
+            <ac:picMk id="17" creationId="{A7EFE361-8FAD-4DDD-B4A1-876B3F212C94}"/>
           </ac:picMkLst>
         </pc:picChg>
         <pc:picChg chg="del">
@@ -542,6 +624,131 @@
             <ac:picMk id="24" creationId="{3579F597-02C8-4EFA-BE97-0F669A727F21}"/>
           </ac:picMkLst>
         </pc:picChg>
+      </pc:sldChg>
+      <pc:sldChg chg="addSp delSp modSp add mod ord">
+        <pc:chgData name="Benjamin AUBRY" userId="3378e7d37fbb753c" providerId="LiveId" clId="{FED6C4F5-8304-439D-91CC-702946B2ECD6}" dt="2020-07-24T21:20:33.704" v="5156" actId="20577"/>
+        <pc:sldMkLst>
+          <pc:docMk/>
+          <pc:sldMk cId="3218071722" sldId="271"/>
+        </pc:sldMkLst>
+        <pc:spChg chg="mod">
+          <ac:chgData name="Benjamin AUBRY" userId="3378e7d37fbb753c" providerId="LiveId" clId="{FED6C4F5-8304-439D-91CC-702946B2ECD6}" dt="2020-07-24T19:41:26.224" v="3076" actId="20577"/>
+          <ac:spMkLst>
+            <pc:docMk/>
+            <pc:sldMk cId="3218071722" sldId="271"/>
+            <ac:spMk id="2" creationId="{4C0BAEDD-75B5-4664-8D67-6B18AC8773C8}"/>
+          </ac:spMkLst>
+        </pc:spChg>
+        <pc:spChg chg="mod">
+          <ac:chgData name="Benjamin AUBRY" userId="3378e7d37fbb753c" providerId="LiveId" clId="{FED6C4F5-8304-439D-91CC-702946B2ECD6}" dt="2020-07-24T19:22:25.313" v="2934" actId="14100"/>
+          <ac:spMkLst>
+            <pc:docMk/>
+            <pc:sldMk cId="3218071722" sldId="271"/>
+            <ac:spMk id="3" creationId="{F9373776-0793-4E8F-8A90-8AA6FCB16820}"/>
+          </ac:spMkLst>
+        </pc:spChg>
+        <pc:spChg chg="del">
+          <ac:chgData name="Benjamin AUBRY" userId="3378e7d37fbb753c" providerId="LiveId" clId="{FED6C4F5-8304-439D-91CC-702946B2ECD6}" dt="2020-07-24T19:23:34.757" v="2935" actId="478"/>
+          <ac:spMkLst>
+            <pc:docMk/>
+            <pc:sldMk cId="3218071722" sldId="271"/>
+            <ac:spMk id="4" creationId="{C540351B-CB3D-4DBF-9D25-8ECDB1082A2E}"/>
+          </ac:spMkLst>
+        </pc:spChg>
+        <pc:spChg chg="del">
+          <ac:chgData name="Benjamin AUBRY" userId="3378e7d37fbb753c" providerId="LiveId" clId="{FED6C4F5-8304-439D-91CC-702946B2ECD6}" dt="2020-07-24T19:36:48.704" v="2941" actId="478"/>
+          <ac:spMkLst>
+            <pc:docMk/>
+            <pc:sldMk cId="3218071722" sldId="271"/>
+            <ac:spMk id="7" creationId="{04B0DE22-D164-4A6D-BEDC-D57B6C5485C9}"/>
+          </ac:spMkLst>
+        </pc:spChg>
+        <pc:spChg chg="add mod">
+          <ac:chgData name="Benjamin AUBRY" userId="3378e7d37fbb753c" providerId="LiveId" clId="{FED6C4F5-8304-439D-91CC-702946B2ECD6}" dt="2020-07-24T21:18:15.385" v="4873" actId="14100"/>
+          <ac:spMkLst>
+            <pc:docMk/>
+            <pc:sldMk cId="3218071722" sldId="271"/>
+            <ac:spMk id="8" creationId="{4CC2CC1E-EDBF-4DAB-8DD9-F54C7DDECA7B}"/>
+          </ac:spMkLst>
+        </pc:spChg>
+        <pc:spChg chg="add mod">
+          <ac:chgData name="Benjamin AUBRY" userId="3378e7d37fbb753c" providerId="LiveId" clId="{FED6C4F5-8304-439D-91CC-702946B2ECD6}" dt="2020-07-24T21:20:33.704" v="5156" actId="20577"/>
+          <ac:spMkLst>
+            <pc:docMk/>
+            <pc:sldMk cId="3218071722" sldId="271"/>
+            <ac:spMk id="12" creationId="{70004ABC-D532-4E71-BE0E-D03BE9F64C7D}"/>
+          </ac:spMkLst>
+        </pc:spChg>
+        <pc:picChg chg="add mod">
+          <ac:chgData name="Benjamin AUBRY" userId="3378e7d37fbb753c" providerId="LiveId" clId="{FED6C4F5-8304-439D-91CC-702946B2ECD6}" dt="2020-07-24T19:36:46.856" v="2940" actId="1076"/>
+          <ac:picMkLst>
+            <pc:docMk/>
+            <pc:sldMk cId="3218071722" sldId="271"/>
+            <ac:picMk id="6" creationId="{40647388-A337-47CC-B82B-9E51F133C3ED}"/>
+          </ac:picMkLst>
+        </pc:picChg>
+        <pc:picChg chg="add mod">
+          <ac:chgData name="Benjamin AUBRY" userId="3378e7d37fbb753c" providerId="LiveId" clId="{FED6C4F5-8304-439D-91CC-702946B2ECD6}" dt="2020-07-24T19:49:45.655" v="3079" actId="1076"/>
+          <ac:picMkLst>
+            <pc:docMk/>
+            <pc:sldMk cId="3218071722" sldId="271"/>
+            <ac:picMk id="11" creationId="{26CA4E92-50D7-49B4-9594-A6ECF7BE335B}"/>
+          </ac:picMkLst>
+        </pc:picChg>
+        <pc:picChg chg="del">
+          <ac:chgData name="Benjamin AUBRY" userId="3378e7d37fbb753c" providerId="LiveId" clId="{FED6C4F5-8304-439D-91CC-702946B2ECD6}" dt="2020-07-24T19:36:37.333" v="2936" actId="478"/>
+          <ac:picMkLst>
+            <pc:docMk/>
+            <pc:sldMk cId="3218071722" sldId="271"/>
+            <ac:picMk id="20" creationId="{71535930-6D9C-46F8-9C1C-5B38D9B74D18}"/>
+          </ac:picMkLst>
+        </pc:picChg>
+        <pc:picChg chg="del">
+          <ac:chgData name="Benjamin AUBRY" userId="3378e7d37fbb753c" providerId="LiveId" clId="{FED6C4F5-8304-439D-91CC-702946B2ECD6}" dt="2020-07-24T19:47:42.771" v="3077" actId="478"/>
+          <ac:picMkLst>
+            <pc:docMk/>
+            <pc:sldMk cId="3218071722" sldId="271"/>
+            <ac:picMk id="24" creationId="{3579F597-02C8-4EFA-BE97-0F669A727F21}"/>
+          </ac:picMkLst>
+        </pc:picChg>
+      </pc:sldChg>
+      <pc:sldChg chg="delSp modSp add mod">
+        <pc:chgData name="Benjamin AUBRY" userId="3378e7d37fbb753c" providerId="LiveId" clId="{FED6C4F5-8304-439D-91CC-702946B2ECD6}" dt="2020-07-24T21:26:04.402" v="5919" actId="20577"/>
+        <pc:sldMkLst>
+          <pc:docMk/>
+          <pc:sldMk cId="2972374305" sldId="272"/>
+        </pc:sldMkLst>
+        <pc:spChg chg="mod">
+          <ac:chgData name="Benjamin AUBRY" userId="3378e7d37fbb753c" providerId="LiveId" clId="{FED6C4F5-8304-439D-91CC-702946B2ECD6}" dt="2020-07-24T21:15:14.187" v="4825" actId="313"/>
+          <ac:spMkLst>
+            <pc:docMk/>
+            <pc:sldMk cId="2972374305" sldId="272"/>
+            <ac:spMk id="2" creationId="{FF377C37-494D-424E-BAE3-ADCBA2DFFF61}"/>
+          </ac:spMkLst>
+        </pc:spChg>
+        <pc:spChg chg="mod">
+          <ac:chgData name="Benjamin AUBRY" userId="3378e7d37fbb753c" providerId="LiveId" clId="{FED6C4F5-8304-439D-91CC-702946B2ECD6}" dt="2020-07-24T21:26:04.402" v="5919" actId="20577"/>
+          <ac:spMkLst>
+            <pc:docMk/>
+            <pc:sldMk cId="2972374305" sldId="272"/>
+            <ac:spMk id="3" creationId="{BA97A59D-0438-4967-9BE0-E79EBDEFE4E2}"/>
+          </ac:spMkLst>
+        </pc:spChg>
+        <pc:picChg chg="del">
+          <ac:chgData name="Benjamin AUBRY" userId="3378e7d37fbb753c" providerId="LiveId" clId="{FED6C4F5-8304-439D-91CC-702946B2ECD6}" dt="2020-07-24T21:14:41.692" v="4791" actId="478"/>
+          <ac:picMkLst>
+            <pc:docMk/>
+            <pc:sldMk cId="2972374305" sldId="272"/>
+            <ac:picMk id="5" creationId="{EE2237B8-8810-4089-A5EA-48AEF17A8F83}"/>
+          </ac:picMkLst>
+        </pc:picChg>
+      </pc:sldChg>
+      <pc:sldChg chg="add del">
+        <pc:chgData name="Benjamin AUBRY" userId="3378e7d37fbb753c" providerId="LiveId" clId="{FED6C4F5-8304-439D-91CC-702946B2ECD6}" dt="2020-07-24T21:09:20.907" v="4143" actId="47"/>
+        <pc:sldMkLst>
+          <pc:docMk/>
+          <pc:sldMk cId="3164171549" sldId="272"/>
+        </pc:sldMkLst>
       </pc:sldChg>
     </pc:docChg>
   </pc:docChgLst>
@@ -605,7 +812,7 @@
           <a:noFill/>
           <a:extLst>
             <a:ext uri="{909E8E84-426E-40dd-AFC4-6F175D3DCCD1}">
-              <a14:hiddenFill xmlns="" xmlns:a14="http://schemas.microsoft.com/office/drawing/2010/main">
+              <a14:hiddenFill xmlns:a14="http://schemas.microsoft.com/office/drawing/2010/main" xmlns="">
                 <a:solidFill>
                   <a:srgbClr val="FFFFFF"/>
                 </a:solidFill>
@@ -664,7 +871,7 @@
             </a:ln>
             <a:extLst>
               <a:ext uri="{91240B29-F687-4f45-9708-019B960494DF}">
-                <a14:hiddenLine xmlns="" xmlns:a14="http://schemas.microsoft.com/office/drawing/2010/main" w="9525">
+                <a14:hiddenLine xmlns:a14="http://schemas.microsoft.com/office/drawing/2010/main" xmlns="" w="9525">
                   <a:solidFill>
                     <a:srgbClr val="000000"/>
                   </a:solidFill>
@@ -754,7 +961,7 @@
             </a:ln>
             <a:extLst>
               <a:ext uri="{91240B29-F687-4f45-9708-019B960494DF}">
-                <a14:hiddenLine xmlns="" xmlns:a14="http://schemas.microsoft.com/office/drawing/2010/main" w="9525">
+                <a14:hiddenLine xmlns:a14="http://schemas.microsoft.com/office/drawing/2010/main" xmlns="" w="9525">
                   <a:solidFill>
                     <a:srgbClr val="000000"/>
                   </a:solidFill>
@@ -844,7 +1051,7 @@
             </a:ln>
             <a:extLst>
               <a:ext uri="{91240B29-F687-4f45-9708-019B960494DF}">
-                <a14:hiddenLine xmlns="" xmlns:a14="http://schemas.microsoft.com/office/drawing/2010/main" w="9525">
+                <a14:hiddenLine xmlns:a14="http://schemas.microsoft.com/office/drawing/2010/main" xmlns="" w="9525">
                   <a:solidFill>
                     <a:srgbClr val="000000"/>
                   </a:solidFill>
@@ -878,7 +1085,7 @@
             </a:ln>
             <a:extLst>
               <a:ext uri="{91240B29-F687-4f45-9708-019B960494DF}">
-                <a14:hiddenLine xmlns="" xmlns:a14="http://schemas.microsoft.com/office/drawing/2010/main" w="9525">
+                <a14:hiddenLine xmlns:a14="http://schemas.microsoft.com/office/drawing/2010/main" xmlns="" w="9525">
                   <a:solidFill>
                     <a:srgbClr val="000000"/>
                   </a:solidFill>
@@ -968,7 +1175,7 @@
             </a:ln>
             <a:extLst>
               <a:ext uri="{91240B29-F687-4f45-9708-019B960494DF}">
-                <a14:hiddenLine xmlns="" xmlns:a14="http://schemas.microsoft.com/office/drawing/2010/main" w="9525">
+                <a14:hiddenLine xmlns:a14="http://schemas.microsoft.com/office/drawing/2010/main" xmlns="" w="9525">
                   <a:solidFill>
                     <a:srgbClr val="000000"/>
                   </a:solidFill>
@@ -1030,7 +1237,7 @@
             </a:ln>
             <a:extLst>
               <a:ext uri="{91240B29-F687-4f45-9708-019B960494DF}">
-                <a14:hiddenLine xmlns="" xmlns:a14="http://schemas.microsoft.com/office/drawing/2010/main" w="9525">
+                <a14:hiddenLine xmlns:a14="http://schemas.microsoft.com/office/drawing/2010/main" xmlns="" w="9525">
                   <a:solidFill>
                     <a:srgbClr val="000000"/>
                   </a:solidFill>
@@ -1092,7 +1299,7 @@
             </a:ln>
             <a:extLst>
               <a:ext uri="{91240B29-F687-4f45-9708-019B960494DF}">
-                <a14:hiddenLine xmlns="" xmlns:a14="http://schemas.microsoft.com/office/drawing/2010/main" w="9525">
+                <a14:hiddenLine xmlns:a14="http://schemas.microsoft.com/office/drawing/2010/main" xmlns="" w="9525">
                   <a:solidFill>
                     <a:srgbClr val="000000"/>
                   </a:solidFill>
@@ -1182,7 +1389,7 @@
             </a:ln>
             <a:extLst>
               <a:ext uri="{91240B29-F687-4f45-9708-019B960494DF}">
-                <a14:hiddenLine xmlns="" xmlns:a14="http://schemas.microsoft.com/office/drawing/2010/main" w="9525">
+                <a14:hiddenLine xmlns:a14="http://schemas.microsoft.com/office/drawing/2010/main" xmlns="" w="9525">
                   <a:solidFill>
                     <a:srgbClr val="000000"/>
                   </a:solidFill>
@@ -1244,7 +1451,7 @@
             </a:ln>
             <a:extLst>
               <a:ext uri="{91240B29-F687-4f45-9708-019B960494DF}">
-                <a14:hiddenLine xmlns="" xmlns:a14="http://schemas.microsoft.com/office/drawing/2010/main" w="9525">
+                <a14:hiddenLine xmlns:a14="http://schemas.microsoft.com/office/drawing/2010/main" xmlns="" w="9525">
                   <a:solidFill>
                     <a:srgbClr val="000000"/>
                   </a:solidFill>
@@ -1306,7 +1513,7 @@
             </a:ln>
             <a:extLst>
               <a:ext uri="{91240B29-F687-4f45-9708-019B960494DF}">
-                <a14:hiddenLine xmlns="" xmlns:a14="http://schemas.microsoft.com/office/drawing/2010/main" w="9525">
+                <a14:hiddenLine xmlns:a14="http://schemas.microsoft.com/office/drawing/2010/main" xmlns="" w="9525">
                   <a:solidFill>
                     <a:srgbClr val="000000"/>
                   </a:solidFill>
@@ -1396,7 +1603,7 @@
             </a:ln>
             <a:extLst>
               <a:ext uri="{91240B29-F687-4f45-9708-019B960494DF}">
-                <a14:hiddenLine xmlns="" xmlns:a14="http://schemas.microsoft.com/office/drawing/2010/main" w="9525">
+                <a14:hiddenLine xmlns:a14="http://schemas.microsoft.com/office/drawing/2010/main" xmlns="" w="9525">
                   <a:solidFill>
                     <a:srgbClr val="000000"/>
                   </a:solidFill>
@@ -1486,7 +1693,7 @@
             </a:ln>
             <a:extLst>
               <a:ext uri="{91240B29-F687-4f45-9708-019B960494DF}">
-                <a14:hiddenLine xmlns="" xmlns:a14="http://schemas.microsoft.com/office/drawing/2010/main" w="9525">
+                <a14:hiddenLine xmlns:a14="http://schemas.microsoft.com/office/drawing/2010/main" xmlns="" w="9525">
                   <a:solidFill>
                     <a:srgbClr val="000000"/>
                   </a:solidFill>
@@ -1548,7 +1755,7 @@
             </a:ln>
             <a:extLst>
               <a:ext uri="{91240B29-F687-4f45-9708-019B960494DF}">
-                <a14:hiddenLine xmlns="" xmlns:a14="http://schemas.microsoft.com/office/drawing/2010/main" w="9525">
+                <a14:hiddenLine xmlns:a14="http://schemas.microsoft.com/office/drawing/2010/main" xmlns="" w="9525">
                   <a:solidFill>
                     <a:srgbClr val="000000"/>
                   </a:solidFill>
@@ -1658,7 +1865,7 @@
             </a:ln>
             <a:extLst>
               <a:ext uri="{91240B29-F687-4f45-9708-019B960494DF}">
-                <a14:hiddenLine xmlns="" xmlns:a14="http://schemas.microsoft.com/office/drawing/2010/main" w="9525">
+                <a14:hiddenLine xmlns:a14="http://schemas.microsoft.com/office/drawing/2010/main" xmlns="" w="9525">
                   <a:solidFill>
                     <a:srgbClr val="000000"/>
                   </a:solidFill>
@@ -1720,7 +1927,7 @@
             </a:ln>
             <a:extLst>
               <a:ext uri="{91240B29-F687-4f45-9708-019B960494DF}">
-                <a14:hiddenLine xmlns="" xmlns:a14="http://schemas.microsoft.com/office/drawing/2010/main" w="9525">
+                <a14:hiddenLine xmlns:a14="http://schemas.microsoft.com/office/drawing/2010/main" xmlns="" w="9525">
                   <a:solidFill>
                     <a:srgbClr val="000000"/>
                   </a:solidFill>
@@ -1810,7 +2017,7 @@
             </a:ln>
             <a:extLst>
               <a:ext uri="{91240B29-F687-4f45-9708-019B960494DF}">
-                <a14:hiddenLine xmlns="" xmlns:a14="http://schemas.microsoft.com/office/drawing/2010/main" w="9525">
+                <a14:hiddenLine xmlns:a14="http://schemas.microsoft.com/office/drawing/2010/main" xmlns="" w="9525">
                   <a:solidFill>
                     <a:srgbClr val="000000"/>
                   </a:solidFill>
@@ -1900,7 +2107,7 @@
             </a:ln>
             <a:extLst>
               <a:ext uri="{91240B29-F687-4f45-9708-019B960494DF}">
-                <a14:hiddenLine xmlns="" xmlns:a14="http://schemas.microsoft.com/office/drawing/2010/main" w="9525">
+                <a14:hiddenLine xmlns:a14="http://schemas.microsoft.com/office/drawing/2010/main" xmlns="" w="9525">
                   <a:solidFill>
                     <a:srgbClr val="000000"/>
                   </a:solidFill>
@@ -1962,7 +2169,7 @@
             </a:ln>
             <a:extLst>
               <a:ext uri="{91240B29-F687-4f45-9708-019B960494DF}">
-                <a14:hiddenLine xmlns="" xmlns:a14="http://schemas.microsoft.com/office/drawing/2010/main" w="9525">
+                <a14:hiddenLine xmlns:a14="http://schemas.microsoft.com/office/drawing/2010/main" xmlns="" w="9525">
                   <a:solidFill>
                     <a:srgbClr val="000000"/>
                   </a:solidFill>
@@ -2052,7 +2259,7 @@
             </a:ln>
             <a:extLst>
               <a:ext uri="{91240B29-F687-4f45-9708-019B960494DF}">
-                <a14:hiddenLine xmlns="" xmlns:a14="http://schemas.microsoft.com/office/drawing/2010/main" w="9525">
+                <a14:hiddenLine xmlns:a14="http://schemas.microsoft.com/office/drawing/2010/main" xmlns="" w="9525">
                   <a:solidFill>
                     <a:srgbClr val="000000"/>
                   </a:solidFill>
@@ -2142,7 +2349,7 @@
             </a:ln>
             <a:extLst>
               <a:ext uri="{91240B29-F687-4f45-9708-019B960494DF}">
-                <a14:hiddenLine xmlns="" xmlns:a14="http://schemas.microsoft.com/office/drawing/2010/main" w="9525">
+                <a14:hiddenLine xmlns:a14="http://schemas.microsoft.com/office/drawing/2010/main" xmlns="" w="9525">
                   <a:solidFill>
                     <a:srgbClr val="000000"/>
                   </a:solidFill>
@@ -2198,7 +2405,7 @@
             </a:ln>
             <a:extLst>
               <a:ext uri="{91240B29-F687-4f45-9708-019B960494DF}">
-                <a14:hiddenLine xmlns="" xmlns:a14="http://schemas.microsoft.com/office/drawing/2010/main" w="9525">
+                <a14:hiddenLine xmlns:a14="http://schemas.microsoft.com/office/drawing/2010/main" xmlns="" w="9525">
                   <a:solidFill>
                     <a:srgbClr val="000000"/>
                   </a:solidFill>
@@ -2288,7 +2495,7 @@
             </a:ln>
             <a:extLst>
               <a:ext uri="{91240B29-F687-4f45-9708-019B960494DF}">
-                <a14:hiddenLine xmlns="" xmlns:a14="http://schemas.microsoft.com/office/drawing/2010/main" w="9525">
+                <a14:hiddenLine xmlns:a14="http://schemas.microsoft.com/office/drawing/2010/main" xmlns="" w="9525">
                   <a:solidFill>
                     <a:srgbClr val="000000"/>
                   </a:solidFill>
@@ -2344,7 +2551,7 @@
             </a:ln>
             <a:extLst>
               <a:ext uri="{91240B29-F687-4f45-9708-019B960494DF}">
-                <a14:hiddenLine xmlns="" xmlns:a14="http://schemas.microsoft.com/office/drawing/2010/main" w="9525">
+                <a14:hiddenLine xmlns:a14="http://schemas.microsoft.com/office/drawing/2010/main" xmlns="" w="9525">
                   <a:solidFill>
                     <a:srgbClr val="000000"/>
                   </a:solidFill>
@@ -2434,7 +2641,7 @@
             </a:ln>
             <a:extLst>
               <a:ext uri="{91240B29-F687-4f45-9708-019B960494DF}">
-                <a14:hiddenLine xmlns="" xmlns:a14="http://schemas.microsoft.com/office/drawing/2010/main" w="9525">
+                <a14:hiddenLine xmlns:a14="http://schemas.microsoft.com/office/drawing/2010/main" xmlns="" w="9525">
                   <a:solidFill>
                     <a:srgbClr val="000000"/>
                   </a:solidFill>
@@ -2502,7 +2709,7 @@
             </a:ln>
             <a:extLst>
               <a:ext uri="{91240B29-F687-4f45-9708-019B960494DF}">
-                <a14:hiddenLine xmlns="" xmlns:a14="http://schemas.microsoft.com/office/drawing/2010/main" w="9525">
+                <a14:hiddenLine xmlns:a14="http://schemas.microsoft.com/office/drawing/2010/main" xmlns="" w="9525">
                   <a:solidFill>
                     <a:srgbClr val="000000"/>
                   </a:solidFill>
@@ -2592,7 +2799,7 @@
             </a:ln>
             <a:extLst>
               <a:ext uri="{91240B29-F687-4f45-9708-019B960494DF}">
-                <a14:hiddenLine xmlns="" xmlns:a14="http://schemas.microsoft.com/office/drawing/2010/main" w="9525">
+                <a14:hiddenLine xmlns:a14="http://schemas.microsoft.com/office/drawing/2010/main" xmlns="" w="9525">
                   <a:solidFill>
                     <a:srgbClr val="000000"/>
                   </a:solidFill>
@@ -2660,7 +2867,7 @@
             </a:ln>
             <a:extLst>
               <a:ext uri="{91240B29-F687-4f45-9708-019B960494DF}">
-                <a14:hiddenLine xmlns="" xmlns:a14="http://schemas.microsoft.com/office/drawing/2010/main" w="9525">
+                <a14:hiddenLine xmlns:a14="http://schemas.microsoft.com/office/drawing/2010/main" xmlns="" w="9525">
                   <a:solidFill>
                     <a:srgbClr val="000000"/>
                   </a:solidFill>
@@ -2750,7 +2957,7 @@
             </a:ln>
             <a:extLst>
               <a:ext uri="{91240B29-F687-4f45-9708-019B960494DF}">
-                <a14:hiddenLine xmlns="" xmlns:a14="http://schemas.microsoft.com/office/drawing/2010/main" w="9525">
+                <a14:hiddenLine xmlns:a14="http://schemas.microsoft.com/office/drawing/2010/main" xmlns="" w="9525">
                   <a:solidFill>
                     <a:srgbClr val="000000"/>
                   </a:solidFill>
@@ -2784,7 +2991,7 @@
             </a:ln>
             <a:extLst>
               <a:ext uri="{91240B29-F687-4f45-9708-019B960494DF}">
-                <a14:hiddenLine xmlns="" xmlns:a14="http://schemas.microsoft.com/office/drawing/2010/main" w="9525">
+                <a14:hiddenLine xmlns:a14="http://schemas.microsoft.com/office/drawing/2010/main" xmlns="" w="9525">
                   <a:solidFill>
                     <a:srgbClr val="000000"/>
                   </a:solidFill>
@@ -2874,7 +3081,7 @@
             </a:ln>
             <a:extLst>
               <a:ext uri="{91240B29-F687-4f45-9708-019B960494DF}">
-                <a14:hiddenLine xmlns="" xmlns:a14="http://schemas.microsoft.com/office/drawing/2010/main" w="9525">
+                <a14:hiddenLine xmlns:a14="http://schemas.microsoft.com/office/drawing/2010/main" xmlns="" w="9525">
                   <a:solidFill>
                     <a:srgbClr val="000000"/>
                   </a:solidFill>
@@ -2936,7 +3143,7 @@
             </a:ln>
             <a:extLst>
               <a:ext uri="{91240B29-F687-4f45-9708-019B960494DF}">
-                <a14:hiddenLine xmlns="" xmlns:a14="http://schemas.microsoft.com/office/drawing/2010/main" w="9525">
+                <a14:hiddenLine xmlns:a14="http://schemas.microsoft.com/office/drawing/2010/main" xmlns="" w="9525">
                   <a:solidFill>
                     <a:srgbClr val="000000"/>
                   </a:solidFill>
@@ -2998,7 +3205,7 @@
             </a:ln>
             <a:extLst>
               <a:ext uri="{91240B29-F687-4f45-9708-019B960494DF}">
-                <a14:hiddenLine xmlns="" xmlns:a14="http://schemas.microsoft.com/office/drawing/2010/main" w="9525">
+                <a14:hiddenLine xmlns:a14="http://schemas.microsoft.com/office/drawing/2010/main" xmlns="" w="9525">
                   <a:solidFill>
                     <a:srgbClr val="000000"/>
                   </a:solidFill>
@@ -3088,7 +3295,7 @@
             </a:ln>
             <a:extLst>
               <a:ext uri="{91240B29-F687-4f45-9708-019B960494DF}">
-                <a14:hiddenLine xmlns="" xmlns:a14="http://schemas.microsoft.com/office/drawing/2010/main" w="9525">
+                <a14:hiddenLine xmlns:a14="http://schemas.microsoft.com/office/drawing/2010/main" xmlns="" w="9525">
                   <a:solidFill>
                     <a:srgbClr val="000000"/>
                   </a:solidFill>
@@ -3156,7 +3363,7 @@
             </a:ln>
             <a:extLst>
               <a:ext uri="{91240B29-F687-4f45-9708-019B960494DF}">
-                <a14:hiddenLine xmlns="" xmlns:a14="http://schemas.microsoft.com/office/drawing/2010/main" w="9525">
+                <a14:hiddenLine xmlns:a14="http://schemas.microsoft.com/office/drawing/2010/main" xmlns="" w="9525">
                   <a:solidFill>
                     <a:srgbClr val="000000"/>
                   </a:solidFill>
@@ -3218,7 +3425,7 @@
             </a:ln>
             <a:extLst>
               <a:ext uri="{91240B29-F687-4f45-9708-019B960494DF}">
-                <a14:hiddenLine xmlns="" xmlns:a14="http://schemas.microsoft.com/office/drawing/2010/main" w="9525">
+                <a14:hiddenLine xmlns:a14="http://schemas.microsoft.com/office/drawing/2010/main" xmlns="" w="9525">
                   <a:solidFill>
                     <a:srgbClr val="000000"/>
                   </a:solidFill>
@@ -3308,7 +3515,7 @@
             </a:ln>
             <a:extLst>
               <a:ext uri="{91240B29-F687-4f45-9708-019B960494DF}">
-                <a14:hiddenLine xmlns="" xmlns:a14="http://schemas.microsoft.com/office/drawing/2010/main" w="9525">
+                <a14:hiddenLine xmlns:a14="http://schemas.microsoft.com/office/drawing/2010/main" xmlns="" w="9525">
                   <a:solidFill>
                     <a:srgbClr val="000000"/>
                   </a:solidFill>
@@ -3370,7 +3577,7 @@
             </a:ln>
             <a:extLst>
               <a:ext uri="{91240B29-F687-4f45-9708-019B960494DF}">
-                <a14:hiddenLine xmlns="" xmlns:a14="http://schemas.microsoft.com/office/drawing/2010/main" w="9525">
+                <a14:hiddenLine xmlns:a14="http://schemas.microsoft.com/office/drawing/2010/main" xmlns="" w="9525">
                   <a:solidFill>
                     <a:srgbClr val="000000"/>
                   </a:solidFill>
@@ -3460,7 +3667,7 @@
             </a:ln>
             <a:extLst>
               <a:ext uri="{91240B29-F687-4f45-9708-019B960494DF}">
-                <a14:hiddenLine xmlns="" xmlns:a14="http://schemas.microsoft.com/office/drawing/2010/main" w="9525">
+                <a14:hiddenLine xmlns:a14="http://schemas.microsoft.com/office/drawing/2010/main" xmlns="" w="9525">
                   <a:solidFill>
                     <a:srgbClr val="000000"/>
                   </a:solidFill>
@@ -3522,7 +3729,7 @@
             </a:ln>
             <a:extLst>
               <a:ext uri="{91240B29-F687-4f45-9708-019B960494DF}">
-                <a14:hiddenLine xmlns="" xmlns:a14="http://schemas.microsoft.com/office/drawing/2010/main" w="9525">
+                <a14:hiddenLine xmlns:a14="http://schemas.microsoft.com/office/drawing/2010/main" xmlns="" w="9525">
                   <a:solidFill>
                     <a:srgbClr val="000000"/>
                   </a:solidFill>
@@ -3612,7 +3819,7 @@
             </a:ln>
             <a:extLst>
               <a:ext uri="{91240B29-F687-4f45-9708-019B960494DF}">
-                <a14:hiddenLine xmlns="" xmlns:a14="http://schemas.microsoft.com/office/drawing/2010/main" w="9525">
+                <a14:hiddenLine xmlns:a14="http://schemas.microsoft.com/office/drawing/2010/main" xmlns="" w="9525">
                   <a:solidFill>
                     <a:srgbClr val="000000"/>
                   </a:solidFill>
@@ -3646,7 +3853,7 @@
             </a:ln>
             <a:extLst>
               <a:ext uri="{91240B29-F687-4f45-9708-019B960494DF}">
-                <a14:hiddenLine xmlns="" xmlns:a14="http://schemas.microsoft.com/office/drawing/2010/main" w="9525">
+                <a14:hiddenLine xmlns:a14="http://schemas.microsoft.com/office/drawing/2010/main" xmlns="" w="9525">
                   <a:solidFill>
                     <a:srgbClr val="000000"/>
                   </a:solidFill>
@@ -3711,7 +3918,7 @@
             </a:ln>
             <a:extLst>
               <a:ext uri="{91240B29-F687-4f45-9708-019B960494DF}">
-                <a14:hiddenLine xmlns="" xmlns:a14="http://schemas.microsoft.com/office/drawing/2010/main" w="9525">
+                <a14:hiddenLine xmlns:a14="http://schemas.microsoft.com/office/drawing/2010/main" xmlns="" w="9525">
                   <a:solidFill>
                     <a:srgbClr val="000000"/>
                   </a:solidFill>
@@ -3801,7 +4008,7 @@
             </a:ln>
             <a:extLst>
               <a:ext uri="{91240B29-F687-4f45-9708-019B960494DF}">
-                <a14:hiddenLine xmlns="" xmlns:a14="http://schemas.microsoft.com/office/drawing/2010/main" w="9525">
+                <a14:hiddenLine xmlns:a14="http://schemas.microsoft.com/office/drawing/2010/main" xmlns="" w="9525">
                   <a:solidFill>
                     <a:srgbClr val="000000"/>
                   </a:solidFill>
@@ -3863,7 +4070,7 @@
             </a:ln>
             <a:extLst>
               <a:ext uri="{91240B29-F687-4f45-9708-019B960494DF}">
-                <a14:hiddenLine xmlns="" xmlns:a14="http://schemas.microsoft.com/office/drawing/2010/main" w="9525">
+                <a14:hiddenLine xmlns:a14="http://schemas.microsoft.com/office/drawing/2010/main" xmlns="" w="9525">
                   <a:solidFill>
                     <a:srgbClr val="000000"/>
                   </a:solidFill>
@@ -3953,7 +4160,7 @@
             </a:ln>
             <a:extLst>
               <a:ext uri="{91240B29-F687-4f45-9708-019B960494DF}">
-                <a14:hiddenLine xmlns="" xmlns:a14="http://schemas.microsoft.com/office/drawing/2010/main" w="9525">
+                <a14:hiddenLine xmlns:a14="http://schemas.microsoft.com/office/drawing/2010/main" xmlns="" w="9525">
                   <a:solidFill>
                     <a:srgbClr val="000000"/>
                   </a:solidFill>
@@ -4043,7 +4250,7 @@
             </a:ln>
             <a:extLst>
               <a:ext uri="{91240B29-F687-4f45-9708-019B960494DF}">
-                <a14:hiddenLine xmlns="" xmlns:a14="http://schemas.microsoft.com/office/drawing/2010/main" w="9525">
+                <a14:hiddenLine xmlns:a14="http://schemas.microsoft.com/office/drawing/2010/main" xmlns="" w="9525">
                   <a:solidFill>
                     <a:srgbClr val="000000"/>
                   </a:solidFill>
@@ -4108,7 +4315,7 @@
             </a:ln>
             <a:extLst>
               <a:ext uri="{91240B29-F687-4f45-9708-019B960494DF}">
-                <a14:hiddenLine xmlns="" xmlns:a14="http://schemas.microsoft.com/office/drawing/2010/main" w="9525">
+                <a14:hiddenLine xmlns:a14="http://schemas.microsoft.com/office/drawing/2010/main" xmlns="" w="9525">
                   <a:solidFill>
                     <a:srgbClr val="000000"/>
                   </a:solidFill>
@@ -4170,7 +4377,7 @@
             </a:ln>
             <a:extLst>
               <a:ext uri="{91240B29-F687-4f45-9708-019B960494DF}">
-                <a14:hiddenLine xmlns="" xmlns:a14="http://schemas.microsoft.com/office/drawing/2010/main" w="9525">
+                <a14:hiddenLine xmlns:a14="http://schemas.microsoft.com/office/drawing/2010/main" xmlns="" w="9525">
                   <a:solidFill>
                     <a:srgbClr val="000000"/>
                   </a:solidFill>
@@ -4260,7 +4467,7 @@
             </a:ln>
             <a:extLst>
               <a:ext uri="{91240B29-F687-4f45-9708-019B960494DF}">
-                <a14:hiddenLine xmlns="" xmlns:a14="http://schemas.microsoft.com/office/drawing/2010/main" w="9525">
+                <a14:hiddenLine xmlns:a14="http://schemas.microsoft.com/office/drawing/2010/main" xmlns="" w="9525">
                   <a:solidFill>
                     <a:srgbClr val="000000"/>
                   </a:solidFill>
@@ -4350,7 +4557,7 @@
             </a:ln>
             <a:extLst>
               <a:ext uri="{91240B29-F687-4f45-9708-019B960494DF}">
-                <a14:hiddenLine xmlns="" xmlns:a14="http://schemas.microsoft.com/office/drawing/2010/main" w="9525">
+                <a14:hiddenLine xmlns:a14="http://schemas.microsoft.com/office/drawing/2010/main" xmlns="" w="9525">
                   <a:solidFill>
                     <a:srgbClr val="000000"/>
                   </a:solidFill>
@@ -4412,7 +4619,7 @@
             </a:ln>
             <a:extLst>
               <a:ext uri="{91240B29-F687-4f45-9708-019B960494DF}">
-                <a14:hiddenLine xmlns="" xmlns:a14="http://schemas.microsoft.com/office/drawing/2010/main" w="9525">
+                <a14:hiddenLine xmlns:a14="http://schemas.microsoft.com/office/drawing/2010/main" xmlns="" w="9525">
                   <a:solidFill>
                     <a:srgbClr val="000000"/>
                   </a:solidFill>
@@ -4532,7 +4739,7 @@
             </a:ln>
             <a:extLst>
               <a:ext uri="{91240B29-F687-4f45-9708-019B960494DF}">
-                <a14:hiddenLine xmlns="" xmlns:a14="http://schemas.microsoft.com/office/drawing/2010/main" w="9525">
+                <a14:hiddenLine xmlns:a14="http://schemas.microsoft.com/office/drawing/2010/main" xmlns="" w="9525">
                   <a:solidFill>
                     <a:srgbClr val="000000"/>
                   </a:solidFill>
@@ -4600,7 +4807,7 @@
             </a:ln>
             <a:extLst>
               <a:ext uri="{91240B29-F687-4f45-9708-019B960494DF}">
-                <a14:hiddenLine xmlns="" xmlns:a14="http://schemas.microsoft.com/office/drawing/2010/main" w="9525">
+                <a14:hiddenLine xmlns:a14="http://schemas.microsoft.com/office/drawing/2010/main" xmlns="" w="9525">
                   <a:solidFill>
                     <a:srgbClr val="000000"/>
                   </a:solidFill>
@@ -4690,7 +4897,7 @@
             </a:ln>
             <a:extLst>
               <a:ext uri="{91240B29-F687-4f45-9708-019B960494DF}">
-                <a14:hiddenLine xmlns="" xmlns:a14="http://schemas.microsoft.com/office/drawing/2010/main" w="9525">
+                <a14:hiddenLine xmlns:a14="http://schemas.microsoft.com/office/drawing/2010/main" xmlns="" w="9525">
                   <a:solidFill>
                     <a:srgbClr val="000000"/>
                   </a:solidFill>
@@ -4830,7 +5037,7 @@
           <a:p>
             <a:fld id="{48A87A34-81AB-432B-8DAE-1953F412C126}" type="datetimeFigureOut">
               <a:rPr lang="en-US" dirty="0"/>
-              <a:t>7/23/2020</a:t>
+              <a:t>7/24/2020</a:t>
             </a:fld>
             <a:endParaRPr lang="en-US" dirty="0"/>
           </a:p>
@@ -5092,7 +5299,7 @@
           <a:p>
             <a:fld id="{48A87A34-81AB-432B-8DAE-1953F412C126}" type="datetimeFigureOut">
               <a:rPr lang="en-US" dirty="0"/>
-              <a:t>7/23/2020</a:t>
+              <a:t>7/24/2020</a:t>
             </a:fld>
             <a:endParaRPr lang="en-US" dirty="0"/>
           </a:p>
@@ -5283,7 +5490,7 @@
           <a:p>
             <a:fld id="{48A87A34-81AB-432B-8DAE-1953F412C126}" type="datetimeFigureOut">
               <a:rPr lang="en-US" dirty="0"/>
-              <a:t>7/23/2020</a:t>
+              <a:t>7/24/2020</a:t>
             </a:fld>
             <a:endParaRPr lang="en-US" dirty="0"/>
           </a:p>
@@ -5541,7 +5748,7 @@
           <a:p>
             <a:fld id="{48A87A34-81AB-432B-8DAE-1953F412C126}" type="datetimeFigureOut">
               <a:rPr lang="en-US" dirty="0"/>
-              <a:t>7/23/2020</a:t>
+              <a:t>7/24/2020</a:t>
             </a:fld>
             <a:endParaRPr lang="en-US" dirty="0"/>
           </a:p>
@@ -5970,7 +6177,7 @@
           <a:p>
             <a:fld id="{48A87A34-81AB-432B-8DAE-1953F412C126}" type="datetimeFigureOut">
               <a:rPr lang="en-US" dirty="0"/>
-              <a:t>7/23/2020</a:t>
+              <a:t>7/24/2020</a:t>
             </a:fld>
             <a:endParaRPr lang="en-US" dirty="0"/>
           </a:p>
@@ -6511,7 +6718,7 @@
           <a:p>
             <a:fld id="{48A87A34-81AB-432B-8DAE-1953F412C126}" type="datetimeFigureOut">
               <a:rPr lang="en-US" dirty="0"/>
-              <a:t>7/23/2020</a:t>
+              <a:t>7/24/2020</a:t>
             </a:fld>
             <a:endParaRPr lang="en-US" dirty="0"/>
           </a:p>
@@ -7226,7 +7433,7 @@
           <a:p>
             <a:fld id="{48A87A34-81AB-432B-8DAE-1953F412C126}" type="datetimeFigureOut">
               <a:rPr lang="en-US" dirty="0"/>
-              <a:t>7/23/2020</a:t>
+              <a:t>7/24/2020</a:t>
             </a:fld>
             <a:endParaRPr lang="en-US" dirty="0"/>
           </a:p>
@@ -7391,7 +7598,7 @@
           <a:p>
             <a:fld id="{48A87A34-81AB-432B-8DAE-1953F412C126}" type="datetimeFigureOut">
               <a:rPr lang="en-US" dirty="0"/>
-              <a:t>7/23/2020</a:t>
+              <a:t>7/24/2020</a:t>
             </a:fld>
             <a:endParaRPr lang="en-US" dirty="0"/>
           </a:p>
@@ -7566,7 +7773,7 @@
           <a:p>
             <a:fld id="{48A87A34-81AB-432B-8DAE-1953F412C126}" type="datetimeFigureOut">
               <a:rPr lang="en-US" dirty="0"/>
-              <a:t>7/23/2020</a:t>
+              <a:t>7/24/2020</a:t>
             </a:fld>
             <a:endParaRPr lang="en-US" dirty="0"/>
           </a:p>
@@ -7731,7 +7938,7 @@
           <a:p>
             <a:fld id="{48A87A34-81AB-432B-8DAE-1953F412C126}" type="datetimeFigureOut">
               <a:rPr lang="en-US" dirty="0"/>
-              <a:t>7/23/2020</a:t>
+              <a:t>7/24/2020</a:t>
             </a:fld>
             <a:endParaRPr lang="en-US" dirty="0"/>
           </a:p>
@@ -7976,7 +8183,7 @@
           <a:p>
             <a:fld id="{48A87A34-81AB-432B-8DAE-1953F412C126}" type="datetimeFigureOut">
               <a:rPr lang="en-US" dirty="0"/>
-              <a:t>7/23/2020</a:t>
+              <a:t>7/24/2020</a:t>
             </a:fld>
             <a:endParaRPr lang="en-US" dirty="0"/>
           </a:p>
@@ -8203,7 +8410,7 @@
           <a:p>
             <a:fld id="{48A87A34-81AB-432B-8DAE-1953F412C126}" type="datetimeFigureOut">
               <a:rPr lang="en-US" dirty="0"/>
-              <a:t>7/23/2020</a:t>
+              <a:t>7/24/2020</a:t>
             </a:fld>
             <a:endParaRPr lang="en-US" dirty="0"/>
           </a:p>
@@ -8579,7 +8786,7 @@
           <a:p>
             <a:fld id="{48A87A34-81AB-432B-8DAE-1953F412C126}" type="datetimeFigureOut">
               <a:rPr lang="en-US" dirty="0"/>
-              <a:t>7/23/2020</a:t>
+              <a:t>7/24/2020</a:t>
             </a:fld>
             <a:endParaRPr lang="en-US" dirty="0"/>
           </a:p>
@@ -8692,7 +8899,7 @@
           <a:p>
             <a:fld id="{48A87A34-81AB-432B-8DAE-1953F412C126}" type="datetimeFigureOut">
               <a:rPr lang="en-US" dirty="0"/>
-              <a:t>7/23/2020</a:t>
+              <a:t>7/24/2020</a:t>
             </a:fld>
             <a:endParaRPr lang="en-US" dirty="0"/>
           </a:p>
@@ -8782,7 +8989,7 @@
           <a:p>
             <a:fld id="{48A87A34-81AB-432B-8DAE-1953F412C126}" type="datetimeFigureOut">
               <a:rPr lang="en-US" dirty="0"/>
-              <a:t>7/23/2020</a:t>
+              <a:t>7/24/2020</a:t>
             </a:fld>
             <a:endParaRPr lang="en-US" dirty="0"/>
           </a:p>
@@ -9026,7 +9233,7 @@
           <a:p>
             <a:fld id="{48A87A34-81AB-432B-8DAE-1953F412C126}" type="datetimeFigureOut">
               <a:rPr lang="en-US" dirty="0"/>
-              <a:t>7/23/2020</a:t>
+              <a:t>7/24/2020</a:t>
             </a:fld>
             <a:endParaRPr lang="en-US" dirty="0"/>
           </a:p>
@@ -9301,7 +9508,7 @@
           <a:p>
             <a:fld id="{48A87A34-81AB-432B-8DAE-1953F412C126}" type="datetimeFigureOut">
               <a:rPr lang="en-US" dirty="0"/>
-              <a:t>7/23/2020</a:t>
+              <a:t>7/24/2020</a:t>
             </a:fld>
             <a:endParaRPr lang="en-US" dirty="0"/>
           </a:p>
@@ -9419,7 +9626,7 @@
           <a:noFill/>
           <a:extLst>
             <a:ext uri="{909E8E84-426E-40dd-AFC4-6F175D3DCCD1}">
-              <a14:hiddenFill xmlns="" xmlns:a14="http://schemas.microsoft.com/office/drawing/2010/main">
+              <a14:hiddenFill xmlns:a14="http://schemas.microsoft.com/office/drawing/2010/main" xmlns="">
                 <a:solidFill>
                   <a:srgbClr val="FFFFFF"/>
                 </a:solidFill>
@@ -9493,7 +9700,7 @@
               </a:ln>
               <a:extLst>
                 <a:ext uri="{91240B29-F687-4f45-9708-019B960494DF}">
-                  <a14:hiddenLine xmlns="" xmlns:a14="http://schemas.microsoft.com/office/drawing/2010/main" w="9525">
+                  <a14:hiddenLine xmlns:a14="http://schemas.microsoft.com/office/drawing/2010/main" xmlns="" w="9525">
                     <a:solidFill>
                       <a:srgbClr val="000000"/>
                     </a:solidFill>
@@ -9583,7 +9790,7 @@
               </a:ln>
               <a:extLst>
                 <a:ext uri="{91240B29-F687-4f45-9708-019B960494DF}">
-                  <a14:hiddenLine xmlns="" xmlns:a14="http://schemas.microsoft.com/office/drawing/2010/main" w="9525">
+                  <a14:hiddenLine xmlns:a14="http://schemas.microsoft.com/office/drawing/2010/main" xmlns="" w="9525">
                     <a:solidFill>
                       <a:srgbClr val="000000"/>
                     </a:solidFill>
@@ -9673,7 +9880,7 @@
               </a:ln>
               <a:extLst>
                 <a:ext uri="{91240B29-F687-4f45-9708-019B960494DF}">
-                  <a14:hiddenLine xmlns="" xmlns:a14="http://schemas.microsoft.com/office/drawing/2010/main" w="9525">
+                  <a14:hiddenLine xmlns:a14="http://schemas.microsoft.com/office/drawing/2010/main" xmlns="" w="9525">
                     <a:solidFill>
                       <a:srgbClr val="000000"/>
                     </a:solidFill>
@@ -9735,7 +9942,7 @@
               </a:ln>
               <a:extLst>
                 <a:ext uri="{91240B29-F687-4f45-9708-019B960494DF}">
-                  <a14:hiddenLine xmlns="" xmlns:a14="http://schemas.microsoft.com/office/drawing/2010/main" w="9525">
+                  <a14:hiddenLine xmlns:a14="http://schemas.microsoft.com/office/drawing/2010/main" xmlns="" w="9525">
                     <a:solidFill>
                       <a:srgbClr val="000000"/>
                     </a:solidFill>
@@ -9825,7 +10032,7 @@
               </a:ln>
               <a:extLst>
                 <a:ext uri="{91240B29-F687-4f45-9708-019B960494DF}">
-                  <a14:hiddenLine xmlns="" xmlns:a14="http://schemas.microsoft.com/office/drawing/2010/main" w="9525">
+                  <a14:hiddenLine xmlns:a14="http://schemas.microsoft.com/office/drawing/2010/main" xmlns="" w="9525">
                     <a:solidFill>
                       <a:srgbClr val="000000"/>
                     </a:solidFill>
@@ -9887,7 +10094,7 @@
               </a:ln>
               <a:extLst>
                 <a:ext uri="{91240B29-F687-4f45-9708-019B960494DF}">
-                  <a14:hiddenLine xmlns="" xmlns:a14="http://schemas.microsoft.com/office/drawing/2010/main" w="9525">
+                  <a14:hiddenLine xmlns:a14="http://schemas.microsoft.com/office/drawing/2010/main" xmlns="" w="9525">
                     <a:solidFill>
                       <a:srgbClr val="000000"/>
                     </a:solidFill>
@@ -9949,7 +10156,7 @@
               </a:ln>
               <a:extLst>
                 <a:ext uri="{91240B29-F687-4f45-9708-019B960494DF}">
-                  <a14:hiddenLine xmlns="" xmlns:a14="http://schemas.microsoft.com/office/drawing/2010/main" w="9525">
+                  <a14:hiddenLine xmlns:a14="http://schemas.microsoft.com/office/drawing/2010/main" xmlns="" w="9525">
                     <a:solidFill>
                       <a:srgbClr val="000000"/>
                     </a:solidFill>
@@ -10039,7 +10246,7 @@
               </a:ln>
               <a:extLst>
                 <a:ext uri="{91240B29-F687-4f45-9708-019B960494DF}">
-                  <a14:hiddenLine xmlns="" xmlns:a14="http://schemas.microsoft.com/office/drawing/2010/main" w="9525">
+                  <a14:hiddenLine xmlns:a14="http://schemas.microsoft.com/office/drawing/2010/main" xmlns="" w="9525">
                     <a:solidFill>
                       <a:srgbClr val="000000"/>
                     </a:solidFill>
@@ -10129,7 +10336,7 @@
               </a:ln>
               <a:extLst>
                 <a:ext uri="{91240B29-F687-4f45-9708-019B960494DF}">
-                  <a14:hiddenLine xmlns="" xmlns:a14="http://schemas.microsoft.com/office/drawing/2010/main" w="9525">
+                  <a14:hiddenLine xmlns:a14="http://schemas.microsoft.com/office/drawing/2010/main" xmlns="" w="9525">
                     <a:solidFill>
                       <a:srgbClr val="000000"/>
                     </a:solidFill>
@@ -10191,7 +10398,7 @@
               </a:ln>
               <a:extLst>
                 <a:ext uri="{91240B29-F687-4f45-9708-019B960494DF}">
-                  <a14:hiddenLine xmlns="" xmlns:a14="http://schemas.microsoft.com/office/drawing/2010/main" w="9525">
+                  <a14:hiddenLine xmlns:a14="http://schemas.microsoft.com/office/drawing/2010/main" xmlns="" w="9525">
                     <a:solidFill>
                       <a:srgbClr val="000000"/>
                     </a:solidFill>
@@ -10301,7 +10508,7 @@
               </a:ln>
               <a:extLst>
                 <a:ext uri="{91240B29-F687-4f45-9708-019B960494DF}">
-                  <a14:hiddenLine xmlns="" xmlns:a14="http://schemas.microsoft.com/office/drawing/2010/main" w="9525">
+                  <a14:hiddenLine xmlns:a14="http://schemas.microsoft.com/office/drawing/2010/main" xmlns="" w="9525">
                     <a:solidFill>
                       <a:srgbClr val="000000"/>
                     </a:solidFill>
@@ -10385,7 +10592,7 @@
               </a:ln>
               <a:extLst>
                 <a:ext uri="{91240B29-F687-4f45-9708-019B960494DF}">
-                  <a14:hiddenLine xmlns="" xmlns:a14="http://schemas.microsoft.com/office/drawing/2010/main" w="9525">
+                  <a14:hiddenLine xmlns:a14="http://schemas.microsoft.com/office/drawing/2010/main" xmlns="" w="9525">
                     <a:solidFill>
                       <a:srgbClr val="000000"/>
                     </a:solidFill>
@@ -10447,7 +10654,7 @@
               </a:ln>
               <a:extLst>
                 <a:ext uri="{91240B29-F687-4f45-9708-019B960494DF}">
-                  <a14:hiddenLine xmlns="" xmlns:a14="http://schemas.microsoft.com/office/drawing/2010/main" w="9525">
+                  <a14:hiddenLine xmlns:a14="http://schemas.microsoft.com/office/drawing/2010/main" xmlns="" w="9525">
                     <a:solidFill>
                       <a:srgbClr val="000000"/>
                     </a:solidFill>
@@ -10509,7 +10716,7 @@
               </a:ln>
               <a:extLst>
                 <a:ext uri="{91240B29-F687-4f45-9708-019B960494DF}">
-                  <a14:hiddenLine xmlns="" xmlns:a14="http://schemas.microsoft.com/office/drawing/2010/main" w="9525">
+                  <a14:hiddenLine xmlns:a14="http://schemas.microsoft.com/office/drawing/2010/main" xmlns="" w="9525">
                     <a:solidFill>
                       <a:srgbClr val="000000"/>
                     </a:solidFill>
@@ -10599,7 +10806,7 @@
               </a:ln>
               <a:extLst>
                 <a:ext uri="{91240B29-F687-4f45-9708-019B960494DF}">
-                  <a14:hiddenLine xmlns="" xmlns:a14="http://schemas.microsoft.com/office/drawing/2010/main" w="9525">
+                  <a14:hiddenLine xmlns:a14="http://schemas.microsoft.com/office/drawing/2010/main" xmlns="" w="9525">
                     <a:solidFill>
                       <a:srgbClr val="000000"/>
                     </a:solidFill>
@@ -10633,7 +10840,7 @@
               </a:ln>
               <a:extLst>
                 <a:ext uri="{91240B29-F687-4f45-9708-019B960494DF}">
-                  <a14:hiddenLine xmlns="" xmlns:a14="http://schemas.microsoft.com/office/drawing/2010/main" w="9525">
+                  <a14:hiddenLine xmlns:a14="http://schemas.microsoft.com/office/drawing/2010/main" xmlns="" w="9525">
                     <a:solidFill>
                       <a:srgbClr val="000000"/>
                     </a:solidFill>
@@ -10698,7 +10905,7 @@
               </a:ln>
               <a:extLst>
                 <a:ext uri="{91240B29-F687-4f45-9708-019B960494DF}">
-                  <a14:hiddenLine xmlns="" xmlns:a14="http://schemas.microsoft.com/office/drawing/2010/main" w="9525">
+                  <a14:hiddenLine xmlns:a14="http://schemas.microsoft.com/office/drawing/2010/main" xmlns="" w="9525">
                     <a:solidFill>
                       <a:srgbClr val="000000"/>
                     </a:solidFill>
@@ -10788,7 +10995,7 @@
               </a:ln>
               <a:extLst>
                 <a:ext uri="{91240B29-F687-4f45-9708-019B960494DF}">
-                  <a14:hiddenLine xmlns="" xmlns:a14="http://schemas.microsoft.com/office/drawing/2010/main" w="9525">
+                  <a14:hiddenLine xmlns:a14="http://schemas.microsoft.com/office/drawing/2010/main" xmlns="" w="9525">
                     <a:solidFill>
                       <a:srgbClr val="000000"/>
                     </a:solidFill>
@@ -10850,7 +11057,7 @@
               </a:ln>
               <a:extLst>
                 <a:ext uri="{91240B29-F687-4f45-9708-019B960494DF}">
-                  <a14:hiddenLine xmlns="" xmlns:a14="http://schemas.microsoft.com/office/drawing/2010/main" w="9525">
+                  <a14:hiddenLine xmlns:a14="http://schemas.microsoft.com/office/drawing/2010/main" xmlns="" w="9525">
                     <a:solidFill>
                       <a:srgbClr val="000000"/>
                     </a:solidFill>
@@ -10940,7 +11147,7 @@
               </a:ln>
               <a:extLst>
                 <a:ext uri="{91240B29-F687-4f45-9708-019B960494DF}">
-                  <a14:hiddenLine xmlns="" xmlns:a14="http://schemas.microsoft.com/office/drawing/2010/main" w="9525">
+                  <a14:hiddenLine xmlns:a14="http://schemas.microsoft.com/office/drawing/2010/main" xmlns="" w="9525">
                     <a:solidFill>
                       <a:srgbClr val="000000"/>
                     </a:solidFill>
@@ -11005,7 +11212,7 @@
               </a:ln>
               <a:extLst>
                 <a:ext uri="{91240B29-F687-4f45-9708-019B960494DF}">
-                  <a14:hiddenLine xmlns="" xmlns:a14="http://schemas.microsoft.com/office/drawing/2010/main" w="9525">
+                  <a14:hiddenLine xmlns:a14="http://schemas.microsoft.com/office/drawing/2010/main" xmlns="" w="9525">
                     <a:solidFill>
                       <a:srgbClr val="000000"/>
                     </a:solidFill>
@@ -11067,7 +11274,7 @@
               </a:ln>
               <a:extLst>
                 <a:ext uri="{91240B29-F687-4f45-9708-019B960494DF}">
-                  <a14:hiddenLine xmlns="" xmlns:a14="http://schemas.microsoft.com/office/drawing/2010/main" w="9525">
+                  <a14:hiddenLine xmlns:a14="http://schemas.microsoft.com/office/drawing/2010/main" xmlns="" w="9525">
                     <a:solidFill>
                       <a:srgbClr val="000000"/>
                     </a:solidFill>
@@ -11157,7 +11364,7 @@
               </a:ln>
               <a:extLst>
                 <a:ext uri="{91240B29-F687-4f45-9708-019B960494DF}">
-                  <a14:hiddenLine xmlns="" xmlns:a14="http://schemas.microsoft.com/office/drawing/2010/main" w="9525">
+                  <a14:hiddenLine xmlns:a14="http://schemas.microsoft.com/office/drawing/2010/main" xmlns="" w="9525">
                     <a:solidFill>
                       <a:srgbClr val="000000"/>
                     </a:solidFill>
@@ -11247,7 +11454,7 @@
               </a:ln>
               <a:extLst>
                 <a:ext uri="{91240B29-F687-4f45-9708-019B960494DF}">
-                  <a14:hiddenLine xmlns="" xmlns:a14="http://schemas.microsoft.com/office/drawing/2010/main" w="9525">
+                  <a14:hiddenLine xmlns:a14="http://schemas.microsoft.com/office/drawing/2010/main" xmlns="" w="9525">
                     <a:solidFill>
                       <a:srgbClr val="000000"/>
                     </a:solidFill>
@@ -11312,7 +11519,7 @@
               </a:ln>
               <a:extLst>
                 <a:ext uri="{91240B29-F687-4f45-9708-019B960494DF}">
-                  <a14:hiddenLine xmlns="" xmlns:a14="http://schemas.microsoft.com/office/drawing/2010/main" w="9525">
+                  <a14:hiddenLine xmlns:a14="http://schemas.microsoft.com/office/drawing/2010/main" xmlns="" w="9525">
                     <a:solidFill>
                       <a:srgbClr val="000000"/>
                     </a:solidFill>
@@ -11432,7 +11639,7 @@
               </a:ln>
               <a:extLst>
                 <a:ext uri="{91240B29-F687-4f45-9708-019B960494DF}">
-                  <a14:hiddenLine xmlns="" xmlns:a14="http://schemas.microsoft.com/office/drawing/2010/main" w="9525">
+                  <a14:hiddenLine xmlns:a14="http://schemas.microsoft.com/office/drawing/2010/main" xmlns="" w="9525">
                     <a:solidFill>
                       <a:srgbClr val="000000"/>
                     </a:solidFill>
@@ -11513,7 +11720,7 @@
               </a:ln>
               <a:extLst>
                 <a:ext uri="{91240B29-F687-4f45-9708-019B960494DF}">
-                  <a14:hiddenLine xmlns="" xmlns:a14="http://schemas.microsoft.com/office/drawing/2010/main" w="9525">
+                  <a14:hiddenLine xmlns:a14="http://schemas.microsoft.com/office/drawing/2010/main" xmlns="" w="9525">
                     <a:solidFill>
                       <a:srgbClr val="000000"/>
                     </a:solidFill>
@@ -11628,7 +11835,7 @@
               </a:ln>
               <a:extLst>
                 <a:ext uri="{91240B29-F687-4f45-9708-019B960494DF}">
-                  <a14:hiddenLine xmlns="" xmlns:a14="http://schemas.microsoft.com/office/drawing/2010/main" w="9525">
+                  <a14:hiddenLine xmlns:a14="http://schemas.microsoft.com/office/drawing/2010/main" xmlns="" w="9525">
                     <a:solidFill>
                       <a:srgbClr val="000000"/>
                     </a:solidFill>
@@ -11718,7 +11925,7 @@
               </a:ln>
               <a:extLst>
                 <a:ext uri="{91240B29-F687-4f45-9708-019B960494DF}">
-                  <a14:hiddenLine xmlns="" xmlns:a14="http://schemas.microsoft.com/office/drawing/2010/main" w="9525">
+                  <a14:hiddenLine xmlns:a14="http://schemas.microsoft.com/office/drawing/2010/main" xmlns="" w="9525">
                     <a:solidFill>
                       <a:srgbClr val="000000"/>
                     </a:solidFill>
@@ -11783,7 +11990,7 @@
               </a:ln>
               <a:extLst>
                 <a:ext uri="{91240B29-F687-4f45-9708-019B960494DF}">
-                  <a14:hiddenLine xmlns="" xmlns:a14="http://schemas.microsoft.com/office/drawing/2010/main" w="9525">
+                  <a14:hiddenLine xmlns:a14="http://schemas.microsoft.com/office/drawing/2010/main" xmlns="" w="9525">
                     <a:solidFill>
                       <a:srgbClr val="000000"/>
                     </a:solidFill>
@@ -11873,7 +12080,7 @@
               </a:ln>
               <a:extLst>
                 <a:ext uri="{91240B29-F687-4f45-9708-019B960494DF}">
-                  <a14:hiddenLine xmlns="" xmlns:a14="http://schemas.microsoft.com/office/drawing/2010/main" w="9525">
+                  <a14:hiddenLine xmlns:a14="http://schemas.microsoft.com/office/drawing/2010/main" xmlns="" w="9525">
                     <a:solidFill>
                       <a:srgbClr val="000000"/>
                     </a:solidFill>
@@ -11941,7 +12148,7 @@
               </a:ln>
               <a:extLst>
                 <a:ext uri="{91240B29-F687-4f45-9708-019B960494DF}">
-                  <a14:hiddenLine xmlns="" xmlns:a14="http://schemas.microsoft.com/office/drawing/2010/main" w="9525">
+                  <a14:hiddenLine xmlns:a14="http://schemas.microsoft.com/office/drawing/2010/main" xmlns="" w="9525">
                     <a:solidFill>
                       <a:srgbClr val="000000"/>
                     </a:solidFill>
@@ -12031,7 +12238,7 @@
               </a:ln>
               <a:extLst>
                 <a:ext uri="{91240B29-F687-4f45-9708-019B960494DF}">
-                  <a14:hiddenLine xmlns="" xmlns:a14="http://schemas.microsoft.com/office/drawing/2010/main" w="9525">
+                  <a14:hiddenLine xmlns:a14="http://schemas.microsoft.com/office/drawing/2010/main" xmlns="" w="9525">
                     <a:solidFill>
                       <a:srgbClr val="000000"/>
                     </a:solidFill>
@@ -12099,7 +12306,7 @@
               </a:ln>
               <a:extLst>
                 <a:ext uri="{91240B29-F687-4f45-9708-019B960494DF}">
-                  <a14:hiddenLine xmlns="" xmlns:a14="http://schemas.microsoft.com/office/drawing/2010/main" w="9525">
+                  <a14:hiddenLine xmlns:a14="http://schemas.microsoft.com/office/drawing/2010/main" xmlns="" w="9525">
                     <a:solidFill>
                       <a:srgbClr val="000000"/>
                     </a:solidFill>
@@ -12189,7 +12396,7 @@
               </a:ln>
               <a:extLst>
                 <a:ext uri="{91240B29-F687-4f45-9708-019B960494DF}">
-                  <a14:hiddenLine xmlns="" xmlns:a14="http://schemas.microsoft.com/office/drawing/2010/main" w="9525">
+                  <a14:hiddenLine xmlns:a14="http://schemas.microsoft.com/office/drawing/2010/main" xmlns="" w="9525">
                     <a:solidFill>
                       <a:srgbClr val="000000"/>
                     </a:solidFill>
@@ -12223,7 +12430,7 @@
               </a:ln>
               <a:extLst>
                 <a:ext uri="{91240B29-F687-4f45-9708-019B960494DF}">
-                  <a14:hiddenLine xmlns="" xmlns:a14="http://schemas.microsoft.com/office/drawing/2010/main" w="9525">
+                  <a14:hiddenLine xmlns:a14="http://schemas.microsoft.com/office/drawing/2010/main" xmlns="" w="9525">
                     <a:solidFill>
                       <a:srgbClr val="000000"/>
                     </a:solidFill>
@@ -12364,7 +12571,7 @@
             <a:fld id="{48A87A34-81AB-432B-8DAE-1953F412C126}" type="datetimeFigureOut">
               <a:rPr lang="en-US" dirty="0"/>
               <a:pPr/>
-              <a:t>7/23/2020</a:t>
+              <a:t>7/24/2020</a:t>
             </a:fld>
             <a:endParaRPr lang="en-US" dirty="0"/>
           </a:p>
@@ -12943,12 +13150,12 @@
         </p:spPr>
         <p:txBody>
           <a:bodyPr>
-            <a:normAutofit fontScale="92500" lnSpcReduction="10000"/>
+            <a:normAutofit/>
           </a:bodyPr>
           <a:lstStyle/>
           <a:p>
             <a:r>
-              <a:rPr lang="en-US" dirty="0">
+              <a:rPr lang="en-US" sz="1600" dirty="0">
                 <a:solidFill>
                   <a:schemeClr val="accent2">
                     <a:lumMod val="75000"/>
@@ -12968,7 +13175,7 @@
           <a:p>
             <a:pPr lvl="1"/>
             <a:r>
-              <a:rPr lang="en-US" dirty="0">
+              <a:rPr lang="en-US" sz="1500" dirty="0">
                 <a:solidFill>
                   <a:schemeClr val="accent2">
                     <a:lumMod val="75000"/>
@@ -12981,7 +13188,7 @@
           <a:p>
             <a:pPr lvl="1"/>
             <a:r>
-              <a:rPr lang="en-US" dirty="0">
+              <a:rPr lang="en-US" sz="1500" dirty="0">
                 <a:solidFill>
                   <a:schemeClr val="accent2">
                     <a:lumMod val="75000"/>
@@ -12994,7 +13201,7 @@
           <a:p>
             <a:pPr lvl="1"/>
             <a:r>
-              <a:rPr lang="en-US" dirty="0">
+              <a:rPr lang="en-US" sz="1500" dirty="0">
                 <a:solidFill>
                   <a:schemeClr val="accent2">
                     <a:lumMod val="75000"/>
@@ -13053,7 +13260,7 @@
         </p:blipFill>
         <p:spPr>
           <a:xfrm>
-            <a:off x="1592428" y="4254166"/>
+            <a:off x="1556625" y="4085724"/>
             <a:ext cx="9075571" cy="2178041"/>
           </a:xfrm>
           <a:prstGeom prst="rect">
@@ -13239,13 +13446,13 @@
         </p:nvSpPr>
         <p:spPr>
           <a:xfrm>
-            <a:off x="1070390" y="885150"/>
-            <a:ext cx="9905999" cy="2086650"/>
+            <a:off x="1070390" y="885149"/>
+            <a:ext cx="9905999" cy="2279692"/>
           </a:xfrm>
         </p:spPr>
         <p:txBody>
           <a:bodyPr>
-            <a:normAutofit fontScale="85000" lnSpcReduction="20000"/>
+            <a:normAutofit fontScale="77500" lnSpcReduction="20000"/>
           </a:bodyPr>
           <a:lstStyle/>
           <a:p>
@@ -13257,7 +13464,7 @@
                   </a:schemeClr>
                 </a:solidFill>
               </a:rPr>
-              <a:t>Using all previous features to predict </a:t>
+              <a:t>Using all previous features to predict (raw data + feature engineering)</a:t>
             </a:r>
           </a:p>
           <a:p>
@@ -13303,7 +13510,29 @@
                   </a:schemeClr>
                 </a:solidFill>
               </a:rPr>
-              <a:t>)				</a:t>
+              <a:t>)</a:t>
+            </a:r>
+          </a:p>
+          <a:p>
+            <a:r>
+              <a:rPr lang="en-US" sz="1900" dirty="0">
+                <a:solidFill>
+                  <a:schemeClr val="accent2">
+                    <a:lumMod val="75000"/>
+                  </a:schemeClr>
+                </a:solidFill>
+              </a:rPr>
+              <a:t>Training/Testing data sets have about 3400/850 data points each respectively (75/25 distribution)</a:t>
+            </a:r>
+            <a:r>
+              <a:rPr lang="en-US" sz="2000" dirty="0">
+                <a:solidFill>
+                  <a:schemeClr val="accent2">
+                    <a:lumMod val="75000"/>
+                  </a:schemeClr>
+                </a:solidFill>
+              </a:rPr>
+              <a:t>			</a:t>
             </a:r>
           </a:p>
           <a:p>
@@ -13320,65 +13549,12 @@
           </a:p>
         </p:txBody>
       </p:sp>
-      <p:sp>
-        <p:nvSpPr>
-          <p:cNvPr id="6" name="TextBox 5">
+      <p:pic>
+        <p:nvPicPr>
+          <p:cNvPr id="20" name="Picture 19">
             <a:extLst>
               <a:ext uri="{FF2B5EF4-FFF2-40B4-BE49-F238E27FC236}">
-                <a16:creationId xmlns:a16="http://schemas.microsoft.com/office/drawing/2014/main" id="{2020A30A-9B34-41E1-BC16-C63E14B7465E}"/>
-              </a:ext>
-            </a:extLst>
-          </p:cNvPr>
-          <p:cNvSpPr txBox="1"/>
-          <p:nvPr/>
-        </p:nvSpPr>
-        <p:spPr>
-          <a:xfrm>
-            <a:off x="47981" y="3331595"/>
-            <a:ext cx="6503631" cy="584775"/>
-          </a:xfrm>
-          <a:prstGeom prst="rect">
-            <a:avLst/>
-          </a:prstGeom>
-          <a:noFill/>
-        </p:spPr>
-        <p:txBody>
-          <a:bodyPr wrap="square" rtlCol="0">
-            <a:spAutoFit/>
-          </a:bodyPr>
-          <a:lstStyle/>
-          <a:p>
-            <a:r>
-              <a:rPr lang="en-US" sz="1600" dirty="0">
-                <a:solidFill>
-                  <a:schemeClr val="accent2">
-                    <a:lumMod val="75000"/>
-                  </a:schemeClr>
-                </a:solidFill>
-              </a:rPr>
-              <a:t>• 3407 data points in the training data set</a:t>
-            </a:r>
-          </a:p>
-          <a:p>
-            <a:r>
-              <a:rPr lang="en-US" sz="1600" dirty="0">
-                <a:solidFill>
-                  <a:schemeClr val="accent2">
-                    <a:lumMod val="75000"/>
-                  </a:schemeClr>
-                </a:solidFill>
-              </a:rPr>
-              <a:t>• 852 data points in the testing data set</a:t>
-            </a:r>
-          </a:p>
-        </p:txBody>
-      </p:sp>
-      <p:pic>
-        <p:nvPicPr>
-          <p:cNvPr id="12" name="Picture 11">
-            <a:extLst>
-              <a:ext uri="{FF2B5EF4-FFF2-40B4-BE49-F238E27FC236}">
-                <a16:creationId xmlns:a16="http://schemas.microsoft.com/office/drawing/2014/main" id="{81198145-7DF1-420D-9878-4B4E45C7CC52}"/>
+                <a16:creationId xmlns:a16="http://schemas.microsoft.com/office/drawing/2014/main" id="{71535930-6D9C-46F8-9C1C-5B38D9B74D18}"/>
               </a:ext>
             </a:extLst>
           </p:cNvPr>
@@ -13395,68 +13571,8 @@
         </p:blipFill>
         <p:spPr>
           <a:xfrm>
-            <a:off x="1466557" y="2757940"/>
-            <a:ext cx="2771775" cy="619125"/>
-          </a:xfrm>
-          <a:prstGeom prst="rect">
-            <a:avLst/>
-          </a:prstGeom>
-        </p:spPr>
-      </p:pic>
-      <p:pic>
-        <p:nvPicPr>
-          <p:cNvPr id="18" name="Picture 17">
-            <a:extLst>
-              <a:ext uri="{FF2B5EF4-FFF2-40B4-BE49-F238E27FC236}">
-                <a16:creationId xmlns:a16="http://schemas.microsoft.com/office/drawing/2014/main" id="{6C1ECC8C-F139-456A-B3C9-72518CF70EF4}"/>
-              </a:ext>
-            </a:extLst>
-          </p:cNvPr>
-          <p:cNvPicPr>
-            <a:picLocks noChangeAspect="1"/>
-          </p:cNvPicPr>
-          <p:nvPr/>
-        </p:nvPicPr>
-        <p:blipFill>
-          <a:blip r:embed="rId3"/>
-          <a:stretch>
-            <a:fillRect/>
-          </a:stretch>
-        </p:blipFill>
-        <p:spPr>
-          <a:xfrm>
-            <a:off x="47981" y="2953202"/>
-            <a:ext cx="1457325" cy="419100"/>
-          </a:xfrm>
-          <a:prstGeom prst="rect">
-            <a:avLst/>
-          </a:prstGeom>
-        </p:spPr>
-      </p:pic>
-      <p:pic>
-        <p:nvPicPr>
-          <p:cNvPr id="20" name="Picture 19">
-            <a:extLst>
-              <a:ext uri="{FF2B5EF4-FFF2-40B4-BE49-F238E27FC236}">
-                <a16:creationId xmlns:a16="http://schemas.microsoft.com/office/drawing/2014/main" id="{71535930-6D9C-46F8-9C1C-5B38D9B74D18}"/>
-              </a:ext>
-            </a:extLst>
-          </p:cNvPr>
-          <p:cNvPicPr>
-            <a:picLocks noChangeAspect="1"/>
-          </p:cNvPicPr>
-          <p:nvPr/>
-        </p:nvPicPr>
-        <p:blipFill>
-          <a:blip r:embed="rId4"/>
-          <a:stretch>
-            <a:fillRect/>
-          </a:stretch>
-        </p:blipFill>
-        <p:spPr>
-          <a:xfrm>
-            <a:off x="5788151" y="2971800"/>
-            <a:ext cx="6127623" cy="2285476"/>
+            <a:off x="719642" y="3279693"/>
+            <a:ext cx="4405904" cy="1643311"/>
           </a:xfrm>
           <a:prstGeom prst="rect">
             <a:avLst/>
@@ -13478,21 +13594,195 @@
           <p:nvPr/>
         </p:nvPicPr>
         <p:blipFill>
-          <a:blip r:embed="rId5"/>
+          <a:blip r:embed="rId3"/>
           <a:stretch>
             <a:fillRect/>
           </a:stretch>
         </p:blipFill>
         <p:spPr>
           <a:xfrm>
-            <a:off x="7400924" y="5384681"/>
-            <a:ext cx="4514850" cy="1176337"/>
+            <a:off x="5794802" y="3312041"/>
+            <a:ext cx="3790448" cy="1610963"/>
           </a:xfrm>
           <a:prstGeom prst="rect">
             <a:avLst/>
           </a:prstGeom>
         </p:spPr>
       </p:pic>
+      <p:sp>
+        <p:nvSpPr>
+          <p:cNvPr id="4" name="TextBox 3">
+            <a:extLst>
+              <a:ext uri="{FF2B5EF4-FFF2-40B4-BE49-F238E27FC236}">
+                <a16:creationId xmlns:a16="http://schemas.microsoft.com/office/drawing/2014/main" id="{C540351B-CB3D-4DBF-9D25-8ECDB1082A2E}"/>
+              </a:ext>
+            </a:extLst>
+          </p:cNvPr>
+          <p:cNvSpPr txBox="1"/>
+          <p:nvPr/>
+        </p:nvSpPr>
+        <p:spPr>
+          <a:xfrm>
+            <a:off x="5738654" y="5070204"/>
+            <a:ext cx="2815389" cy="1477328"/>
+          </a:xfrm>
+          <a:prstGeom prst="rect">
+            <a:avLst/>
+          </a:prstGeom>
+          <a:noFill/>
+        </p:spPr>
+        <p:txBody>
+          <a:bodyPr wrap="square" rtlCol="0">
+            <a:spAutoFit/>
+          </a:bodyPr>
+          <a:lstStyle/>
+          <a:p>
+            <a:r>
+              <a:rPr lang="en-US" sz="1500" b="1" u="sng" dirty="0">
+                <a:solidFill>
+                  <a:schemeClr val="tx1">
+                    <a:lumMod val="95000"/>
+                  </a:schemeClr>
+                </a:solidFill>
+              </a:rPr>
+              <a:t>Best Features Coefficients:</a:t>
+            </a:r>
+          </a:p>
+          <a:p>
+            <a:r>
+              <a:rPr lang="en-US" sz="1500" dirty="0">
+                <a:solidFill>
+                  <a:schemeClr val="tx1">
+                    <a:lumMod val="95000"/>
+                  </a:schemeClr>
+                </a:solidFill>
+              </a:rPr>
+              <a:t>• SP500 Returns: </a:t>
+            </a:r>
+            <a:r>
+              <a:rPr lang="en-US" sz="1500" dirty="0"/>
+              <a:t>0.785</a:t>
+            </a:r>
+          </a:p>
+          <a:p>
+            <a:r>
+              <a:rPr lang="en-US" sz="1500" dirty="0"/>
+              <a:t>• USDJPY: 0.121</a:t>
+            </a:r>
+          </a:p>
+          <a:p>
+            <a:r>
+              <a:rPr lang="en-US" sz="1500" dirty="0">
+                <a:solidFill>
+                  <a:schemeClr val="tx1">
+                    <a:lumMod val="95000"/>
+                  </a:schemeClr>
+                </a:solidFill>
+              </a:rPr>
+              <a:t>• VIX 21day MA: </a:t>
+            </a:r>
+            <a:r>
+              <a:rPr lang="en-US" sz="1500" dirty="0"/>
+              <a:t>0.0585</a:t>
+            </a:r>
+          </a:p>
+          <a:p>
+            <a:endParaRPr lang="en-US" sz="1500" dirty="0"/>
+          </a:p>
+          <a:p>
+            <a:endParaRPr lang="en-US" sz="1500" dirty="0">
+              <a:solidFill>
+                <a:schemeClr val="tx1">
+                  <a:lumMod val="95000"/>
+                </a:schemeClr>
+              </a:solidFill>
+            </a:endParaRPr>
+          </a:p>
+        </p:txBody>
+      </p:sp>
+      <p:sp>
+        <p:nvSpPr>
+          <p:cNvPr id="7" name="TextBox 6">
+            <a:extLst>
+              <a:ext uri="{FF2B5EF4-FFF2-40B4-BE49-F238E27FC236}">
+                <a16:creationId xmlns:a16="http://schemas.microsoft.com/office/drawing/2014/main" id="{04B0DE22-D164-4A6D-BEDC-D57B6C5485C9}"/>
+              </a:ext>
+            </a:extLst>
+          </p:cNvPr>
+          <p:cNvSpPr txBox="1"/>
+          <p:nvPr/>
+        </p:nvSpPr>
+        <p:spPr>
+          <a:xfrm>
+            <a:off x="637264" y="5037856"/>
+            <a:ext cx="4271620" cy="2169825"/>
+          </a:xfrm>
+          <a:prstGeom prst="rect">
+            <a:avLst/>
+          </a:prstGeom>
+          <a:noFill/>
+        </p:spPr>
+        <p:txBody>
+          <a:bodyPr wrap="square" rtlCol="0">
+            <a:spAutoFit/>
+          </a:bodyPr>
+          <a:lstStyle/>
+          <a:p>
+            <a:r>
+              <a:rPr lang="en-US" sz="1500" b="1" u="sng" dirty="0">
+                <a:solidFill>
+                  <a:schemeClr val="tx1">
+                    <a:lumMod val="95000"/>
+                  </a:schemeClr>
+                </a:solidFill>
+              </a:rPr>
+              <a:t>Confusion Matrix Results:</a:t>
+            </a:r>
+          </a:p>
+          <a:p>
+            <a:r>
+              <a:rPr lang="en-US" sz="1500" dirty="0">
+                <a:solidFill>
+                  <a:schemeClr val="tx1">
+                    <a:lumMod val="95000"/>
+                  </a:schemeClr>
+                </a:solidFill>
+              </a:rPr>
+              <a:t>• Overall, the model predicts the long/short classes with an accuracy of 59%</a:t>
+            </a:r>
+          </a:p>
+          <a:p>
+            <a:r>
+              <a:rPr lang="en-US" sz="1500" dirty="0">
+                <a:solidFill>
+                  <a:schemeClr val="tx1">
+                    <a:lumMod val="95000"/>
+                  </a:schemeClr>
+                </a:solidFill>
+              </a:rPr>
+              <a:t>• Buy trading signals account for 77% of the correct signals predicted</a:t>
+            </a:r>
+          </a:p>
+          <a:p>
+            <a:r>
+              <a:rPr lang="en-US" sz="1500" dirty="0"/>
+              <a:t>• Low performance of Sell signals relative to Buy signals with a high score on the False Negative side</a:t>
+            </a:r>
+          </a:p>
+          <a:p>
+            <a:endParaRPr lang="en-US" sz="1500" dirty="0"/>
+          </a:p>
+          <a:p>
+            <a:endParaRPr lang="en-US" sz="1500" dirty="0">
+              <a:solidFill>
+                <a:schemeClr val="tx1">
+                  <a:lumMod val="95000"/>
+                </a:schemeClr>
+              </a:solidFill>
+            </a:endParaRPr>
+          </a:p>
+        </p:txBody>
+      </p:sp>
     </p:spTree>
     <p:extLst>
       <p:ext uri="{BB962C8B-B14F-4D97-AF65-F5344CB8AC3E}">
@@ -13547,14 +13837,14 @@
         </p:spPr>
         <p:txBody>
           <a:bodyPr>
-            <a:normAutofit/>
+            <a:normAutofit fontScale="90000"/>
           </a:bodyPr>
           <a:lstStyle/>
           <a:p>
             <a:pPr algn="ctr"/>
             <a:r>
               <a:rPr lang="en-US" sz="2600" dirty="0"/>
-              <a:t>LogiSTIC REGRESSION – shorter time frame</a:t>
+              <a:t>LogiSTIC REGRESSION – Best selected features FROM PREVIOUS MODEL</a:t>
             </a:r>
           </a:p>
         </p:txBody>
@@ -13577,13 +13867,401 @@
         </p:nvSpPr>
         <p:spPr>
           <a:xfrm>
-            <a:off x="1070390" y="885149"/>
-            <a:ext cx="9905999" cy="4103230"/>
+            <a:off x="1070390" y="885148"/>
+            <a:ext cx="9905999" cy="2002431"/>
           </a:xfrm>
         </p:spPr>
         <p:txBody>
           <a:bodyPr>
             <a:normAutofit/>
+          </a:bodyPr>
+          <a:lstStyle/>
+          <a:p>
+            <a:r>
+              <a:rPr lang="en-US" sz="1900" dirty="0">
+                <a:solidFill>
+                  <a:schemeClr val="accent2">
+                    <a:lumMod val="75000"/>
+                  </a:schemeClr>
+                </a:solidFill>
+              </a:rPr>
+              <a:t>Building on the previous model, decided to model the signal as a function of the below 3 variables:</a:t>
+            </a:r>
+          </a:p>
+          <a:p>
+            <a:pPr lvl="1"/>
+            <a:r>
+              <a:rPr lang="en-US" sz="1500" dirty="0">
+                <a:solidFill>
+                  <a:schemeClr val="accent2">
+                    <a:lumMod val="75000"/>
+                  </a:schemeClr>
+                </a:solidFill>
+              </a:rPr>
+              <a:t>SP500 Returns</a:t>
+            </a:r>
+          </a:p>
+          <a:p>
+            <a:pPr lvl="1"/>
+            <a:r>
+              <a:rPr lang="en-US" sz="1500" dirty="0">
+                <a:solidFill>
+                  <a:schemeClr val="accent2">
+                    <a:lumMod val="75000"/>
+                  </a:schemeClr>
+                </a:solidFill>
+              </a:rPr>
+              <a:t>USDJPY FX Rate</a:t>
+            </a:r>
+          </a:p>
+          <a:p>
+            <a:pPr lvl="1"/>
+            <a:r>
+              <a:rPr lang="en-US" sz="1500" dirty="0">
+                <a:solidFill>
+                  <a:schemeClr val="accent2">
+                    <a:lumMod val="75000"/>
+                  </a:schemeClr>
+                </a:solidFill>
+              </a:rPr>
+              <a:t>VIX 21day Moving Average</a:t>
+            </a:r>
+            <a:r>
+              <a:rPr lang="en-US" sz="2000" dirty="0">
+                <a:solidFill>
+                  <a:schemeClr val="accent2">
+                    <a:lumMod val="75000"/>
+                  </a:schemeClr>
+                </a:solidFill>
+              </a:rPr>
+              <a:t>			</a:t>
+            </a:r>
+          </a:p>
+          <a:p>
+            <a:pPr marL="0" indent="0" algn="r">
+              <a:buNone/>
+            </a:pPr>
+            <a:endParaRPr lang="en-US" sz="2800" u="sng" dirty="0">
+              <a:solidFill>
+                <a:schemeClr val="accent2">
+                  <a:lumMod val="75000"/>
+                </a:schemeClr>
+              </a:solidFill>
+            </a:endParaRPr>
+          </a:p>
+        </p:txBody>
+      </p:sp>
+      <p:pic>
+        <p:nvPicPr>
+          <p:cNvPr id="6" name="Picture 5">
+            <a:extLst>
+              <a:ext uri="{FF2B5EF4-FFF2-40B4-BE49-F238E27FC236}">
+                <a16:creationId xmlns:a16="http://schemas.microsoft.com/office/drawing/2014/main" id="{40647388-A337-47CC-B82B-9E51F133C3ED}"/>
+              </a:ext>
+            </a:extLst>
+          </p:cNvPr>
+          <p:cNvPicPr>
+            <a:picLocks noChangeAspect="1"/>
+          </p:cNvPicPr>
+          <p:nvPr/>
+        </p:nvPicPr>
+        <p:blipFill>
+          <a:blip r:embed="rId2"/>
+          <a:stretch>
+            <a:fillRect/>
+          </a:stretch>
+        </p:blipFill>
+        <p:spPr>
+          <a:xfrm>
+            <a:off x="456449" y="2887579"/>
+            <a:ext cx="4702092" cy="1796734"/>
+          </a:xfrm>
+          <a:prstGeom prst="rect">
+            <a:avLst/>
+          </a:prstGeom>
+        </p:spPr>
+      </p:pic>
+      <p:sp>
+        <p:nvSpPr>
+          <p:cNvPr id="8" name="TextBox 7">
+            <a:extLst>
+              <a:ext uri="{FF2B5EF4-FFF2-40B4-BE49-F238E27FC236}">
+                <a16:creationId xmlns:a16="http://schemas.microsoft.com/office/drawing/2014/main" id="{4CC2CC1E-EDBF-4DAB-8DD9-F54C7DDECA7B}"/>
+              </a:ext>
+            </a:extLst>
+          </p:cNvPr>
+          <p:cNvSpPr txBox="1"/>
+          <p:nvPr/>
+        </p:nvSpPr>
+        <p:spPr>
+          <a:xfrm>
+            <a:off x="456449" y="4781181"/>
+            <a:ext cx="4019298" cy="1938992"/>
+          </a:xfrm>
+          <a:prstGeom prst="rect">
+            <a:avLst/>
+          </a:prstGeom>
+          <a:noFill/>
+        </p:spPr>
+        <p:txBody>
+          <a:bodyPr wrap="square" rtlCol="0">
+            <a:spAutoFit/>
+          </a:bodyPr>
+          <a:lstStyle/>
+          <a:p>
+            <a:r>
+              <a:rPr lang="en-US" sz="1500" b="1" u="sng" dirty="0">
+                <a:solidFill>
+                  <a:schemeClr val="tx1">
+                    <a:lumMod val="95000"/>
+                  </a:schemeClr>
+                </a:solidFill>
+              </a:rPr>
+              <a:t>Confusion Matrix Results:</a:t>
+            </a:r>
+          </a:p>
+          <a:p>
+            <a:r>
+              <a:rPr lang="en-US" sz="1500" dirty="0">
+                <a:solidFill>
+                  <a:schemeClr val="tx1">
+                    <a:lumMod val="95000"/>
+                  </a:schemeClr>
+                </a:solidFill>
+              </a:rPr>
+              <a:t>• Overall, the accuracy is the same as the previous model (the one with all the data)</a:t>
+            </a:r>
+          </a:p>
+          <a:p>
+            <a:endParaRPr lang="en-US" sz="1500" dirty="0">
+              <a:solidFill>
+                <a:schemeClr val="tx1">
+                  <a:lumMod val="95000"/>
+                </a:schemeClr>
+              </a:solidFill>
+            </a:endParaRPr>
+          </a:p>
+          <a:p>
+            <a:r>
+              <a:rPr lang="en-US" sz="1500" dirty="0">
+                <a:solidFill>
+                  <a:schemeClr val="tx1">
+                    <a:lumMod val="95000"/>
+                  </a:schemeClr>
+                </a:solidFill>
+              </a:rPr>
+              <a:t>• Higher True Positives but also higher False Negatives</a:t>
+            </a:r>
+          </a:p>
+          <a:p>
+            <a:endParaRPr lang="en-US" sz="1500" dirty="0"/>
+          </a:p>
+          <a:p>
+            <a:endParaRPr lang="en-US" sz="1500" dirty="0">
+              <a:solidFill>
+                <a:schemeClr val="tx1">
+                  <a:lumMod val="95000"/>
+                </a:schemeClr>
+              </a:solidFill>
+            </a:endParaRPr>
+          </a:p>
+        </p:txBody>
+      </p:sp>
+      <p:pic>
+        <p:nvPicPr>
+          <p:cNvPr id="11" name="Picture 10">
+            <a:extLst>
+              <a:ext uri="{FF2B5EF4-FFF2-40B4-BE49-F238E27FC236}">
+                <a16:creationId xmlns:a16="http://schemas.microsoft.com/office/drawing/2014/main" id="{26CA4E92-50D7-49B4-9594-A6ECF7BE335B}"/>
+              </a:ext>
+            </a:extLst>
+          </p:cNvPr>
+          <p:cNvPicPr>
+            <a:picLocks noChangeAspect="1"/>
+          </p:cNvPicPr>
+          <p:nvPr/>
+        </p:nvPicPr>
+        <p:blipFill>
+          <a:blip r:embed="rId3"/>
+          <a:stretch>
+            <a:fillRect/>
+          </a:stretch>
+        </p:blipFill>
+        <p:spPr>
+          <a:xfrm>
+            <a:off x="5556876" y="2887579"/>
+            <a:ext cx="5067300" cy="1562100"/>
+          </a:xfrm>
+          <a:prstGeom prst="rect">
+            <a:avLst/>
+          </a:prstGeom>
+        </p:spPr>
+      </p:pic>
+      <p:sp>
+        <p:nvSpPr>
+          <p:cNvPr id="12" name="TextBox 11">
+            <a:extLst>
+              <a:ext uri="{FF2B5EF4-FFF2-40B4-BE49-F238E27FC236}">
+                <a16:creationId xmlns:a16="http://schemas.microsoft.com/office/drawing/2014/main" id="{70004ABC-D532-4E71-BE0E-D03BE9F64C7D}"/>
+              </a:ext>
+            </a:extLst>
+          </p:cNvPr>
+          <p:cNvSpPr txBox="1"/>
+          <p:nvPr/>
+        </p:nvSpPr>
+        <p:spPr>
+          <a:xfrm>
+            <a:off x="5461586" y="4781181"/>
+            <a:ext cx="4019298" cy="1708160"/>
+          </a:xfrm>
+          <a:prstGeom prst="rect">
+            <a:avLst/>
+          </a:prstGeom>
+          <a:noFill/>
+        </p:spPr>
+        <p:txBody>
+          <a:bodyPr wrap="square" rtlCol="0">
+            <a:spAutoFit/>
+          </a:bodyPr>
+          <a:lstStyle/>
+          <a:p>
+            <a:r>
+              <a:rPr lang="en-US" sz="1500" dirty="0">
+                <a:solidFill>
+                  <a:schemeClr val="tx1">
+                    <a:lumMod val="95000"/>
+                  </a:schemeClr>
+                </a:solidFill>
+              </a:rPr>
+              <a:t>• Adding more data to the model proved to be adding noise instead of value.</a:t>
+            </a:r>
+          </a:p>
+          <a:p>
+            <a:endParaRPr lang="en-US" sz="1500" dirty="0">
+              <a:solidFill>
+                <a:schemeClr val="tx1">
+                  <a:lumMod val="95000"/>
+                </a:schemeClr>
+              </a:solidFill>
+            </a:endParaRPr>
+          </a:p>
+          <a:p>
+            <a:r>
+              <a:rPr lang="en-US" sz="1500" dirty="0">
+                <a:solidFill>
+                  <a:schemeClr val="tx1">
+                    <a:lumMod val="95000"/>
+                  </a:schemeClr>
+                </a:solidFill>
+              </a:rPr>
+              <a:t>• Ability to get a similar score with model containing 3 features instead of 59 !!!</a:t>
+            </a:r>
+          </a:p>
+          <a:p>
+            <a:endParaRPr lang="en-US" sz="1500" dirty="0"/>
+          </a:p>
+          <a:p>
+            <a:endParaRPr lang="en-US" sz="1500" dirty="0">
+              <a:solidFill>
+                <a:schemeClr val="tx1">
+                  <a:lumMod val="95000"/>
+                </a:schemeClr>
+              </a:solidFill>
+            </a:endParaRPr>
+          </a:p>
+        </p:txBody>
+      </p:sp>
+    </p:spTree>
+    <p:extLst>
+      <p:ext uri="{BB962C8B-B14F-4D97-AF65-F5344CB8AC3E}">
+        <p14:creationId xmlns:p14="http://schemas.microsoft.com/office/powerpoint/2010/main" val="3218071722"/>
+      </p:ext>
+    </p:extLst>
+  </p:cSld>
+  <p:clrMapOvr>
+    <a:masterClrMapping/>
+  </p:clrMapOvr>
+</p:sld>
+</file>
+
+<file path=ppt/slides/slide6.xml><?xml version="1.0" encoding="utf-8"?>
+<p:sld xmlns:a="http://schemas.openxmlformats.org/drawingml/2006/main" xmlns:r="http://schemas.openxmlformats.org/officeDocument/2006/relationships" xmlns:p="http://schemas.openxmlformats.org/presentationml/2006/main">
+  <p:cSld>
+    <p:spTree>
+      <p:nvGrpSpPr>
+        <p:cNvPr id="1" name=""/>
+        <p:cNvGrpSpPr/>
+        <p:nvPr/>
+      </p:nvGrpSpPr>
+      <p:grpSpPr>
+        <a:xfrm>
+          <a:off x="0" y="0"/>
+          <a:ext cx="0" cy="0"/>
+          <a:chOff x="0" y="0"/>
+          <a:chExt cx="0" cy="0"/>
+        </a:xfrm>
+      </p:grpSpPr>
+      <p:sp>
+        <p:nvSpPr>
+          <p:cNvPr id="2" name="Title 1">
+            <a:extLst>
+              <a:ext uri="{FF2B5EF4-FFF2-40B4-BE49-F238E27FC236}">
+                <a16:creationId xmlns:a16="http://schemas.microsoft.com/office/drawing/2014/main" id="{4C0BAEDD-75B5-4664-8D67-6B18AC8773C8}"/>
+              </a:ext>
+            </a:extLst>
+          </p:cNvPr>
+          <p:cNvSpPr>
+            <a:spLocks noGrp="1"/>
+          </p:cNvSpPr>
+          <p:nvPr>
+            <p:ph type="title"/>
+          </p:nvPr>
+        </p:nvSpPr>
+        <p:spPr>
+          <a:xfrm>
+            <a:off x="1070390" y="181298"/>
+            <a:ext cx="9905998" cy="498611"/>
+          </a:xfrm>
+        </p:spPr>
+        <p:txBody>
+          <a:bodyPr>
+            <a:normAutofit/>
+          </a:bodyPr>
+          <a:lstStyle/>
+          <a:p>
+            <a:pPr algn="ctr"/>
+            <a:r>
+              <a:rPr lang="en-US" sz="2600" dirty="0"/>
+              <a:t>LogiSTIC REGRESSION – ADDING short time indicators</a:t>
+            </a:r>
+          </a:p>
+        </p:txBody>
+      </p:sp>
+      <p:sp>
+        <p:nvSpPr>
+          <p:cNvPr id="3" name="Content Placeholder 2">
+            <a:extLst>
+              <a:ext uri="{FF2B5EF4-FFF2-40B4-BE49-F238E27FC236}">
+                <a16:creationId xmlns:a16="http://schemas.microsoft.com/office/drawing/2014/main" id="{F9373776-0793-4E8F-8A90-8AA6FCB16820}"/>
+              </a:ext>
+            </a:extLst>
+          </p:cNvPr>
+          <p:cNvSpPr>
+            <a:spLocks noGrp="1"/>
+          </p:cNvSpPr>
+          <p:nvPr>
+            <p:ph idx="1"/>
+          </p:nvPr>
+        </p:nvSpPr>
+        <p:spPr>
+          <a:xfrm>
+            <a:off x="1070390" y="885150"/>
+            <a:ext cx="9905999" cy="2066598"/>
+          </a:xfrm>
+        </p:spPr>
+        <p:txBody>
+          <a:bodyPr>
+            <a:normAutofit fontScale="92500" lnSpcReduction="10000"/>
           </a:bodyPr>
           <a:lstStyle/>
           <a:p>
@@ -13643,20 +14321,20 @@
                   </a:schemeClr>
                 </a:solidFill>
               </a:rPr>
-              <a:t>The Nikkei and the S&amp;P500 are highly correlated (as a matter of fact, a lot of stock market indices are correlated to the S&amp;P as it acts as the main driver)</a:t>
+              <a:t>The Nikkei and the S&amp;P500 are highly correlated (the S&amp;P usually acts as the main driver of global stock markets)</a:t>
             </a:r>
           </a:p>
           <a:p>
-            <a:r>
-              <a:rPr lang="en-US" sz="1600" dirty="0">
-                <a:solidFill>
-                  <a:schemeClr val="accent2">
-                    <a:lumMod val="75000"/>
-                  </a:schemeClr>
-                </a:solidFill>
-              </a:rPr>
-              <a:t> </a:t>
-            </a:r>
+            <a:pPr marL="0" indent="0">
+              <a:buNone/>
+            </a:pPr>
+            <a:endParaRPr lang="en-US" sz="1600" dirty="0">
+              <a:solidFill>
+                <a:schemeClr val="accent2">
+                  <a:lumMod val="75000"/>
+                </a:schemeClr>
+              </a:solidFill>
+            </a:endParaRPr>
           </a:p>
           <a:p>
             <a:pPr marL="0" indent="0" algn="r">
@@ -13702,65 +14380,12 @@
           </a:prstGeom>
         </p:spPr>
       </p:pic>
-      <p:sp>
-        <p:nvSpPr>
-          <p:cNvPr id="5" name="Rectangle 4">
+      <p:pic>
+        <p:nvPicPr>
+          <p:cNvPr id="7" name="Picture 6">
             <a:extLst>
               <a:ext uri="{FF2B5EF4-FFF2-40B4-BE49-F238E27FC236}">
-                <a16:creationId xmlns:a16="http://schemas.microsoft.com/office/drawing/2014/main" id="{FD05A975-6929-4093-BA9E-FCC12364EB0C}"/>
-              </a:ext>
-            </a:extLst>
-          </p:cNvPr>
-          <p:cNvSpPr/>
-          <p:nvPr/>
-        </p:nvSpPr>
-        <p:spPr>
-          <a:xfrm>
-            <a:off x="455612" y="4665213"/>
-            <a:ext cx="6096000" cy="646331"/>
-          </a:xfrm>
-          <a:prstGeom prst="rect">
-            <a:avLst/>
-          </a:prstGeom>
-        </p:spPr>
-        <p:txBody>
-          <a:bodyPr>
-            <a:spAutoFit/>
-          </a:bodyPr>
-          <a:lstStyle/>
-          <a:p>
-            <a:r>
-              <a:rPr lang="en-US" dirty="0">
-                <a:solidFill>
-                  <a:schemeClr val="accent2">
-                    <a:lumMod val="75000"/>
-                  </a:schemeClr>
-                </a:solidFill>
-              </a:rPr>
-              <a:t>• 3407 data points in the training data set</a:t>
-            </a:r>
-          </a:p>
-          <a:p>
-            <a:r>
-              <a:rPr lang="en-US" dirty="0">
-                <a:solidFill>
-                  <a:schemeClr val="accent2">
-                    <a:lumMod val="75000"/>
-                  </a:schemeClr>
-                </a:solidFill>
-              </a:rPr>
-              <a:t>• 852 data points in the testing data set</a:t>
-            </a:r>
-            <a:endParaRPr lang="en-US" dirty="0"/>
-          </a:p>
-        </p:txBody>
-      </p:sp>
-      <p:pic>
-        <p:nvPicPr>
-          <p:cNvPr id="8" name="Picture 7">
-            <a:extLst>
-              <a:ext uri="{FF2B5EF4-FFF2-40B4-BE49-F238E27FC236}">
-                <a16:creationId xmlns:a16="http://schemas.microsoft.com/office/drawing/2014/main" id="{6AD39632-B931-4CF8-A5B6-F9734B3D0306}"/>
+                <a16:creationId xmlns:a16="http://schemas.microsoft.com/office/drawing/2014/main" id="{57856F3C-D390-4E0D-B885-AC7C59766801}"/>
               </a:ext>
             </a:extLst>
           </p:cNvPr>
@@ -13777,8 +14402,8 @@
         </p:blipFill>
         <p:spPr>
           <a:xfrm>
-            <a:off x="8035675" y="3352343"/>
-            <a:ext cx="3700713" cy="1959201"/>
+            <a:off x="234114" y="4890475"/>
+            <a:ext cx="5461484" cy="1633310"/>
           </a:xfrm>
           <a:prstGeom prst="rect">
             <a:avLst/>
@@ -13787,10 +14412,10 @@
       </p:pic>
       <p:pic>
         <p:nvPicPr>
-          <p:cNvPr id="11" name="Picture 10">
+          <p:cNvPr id="10" name="Picture 9">
             <a:extLst>
               <a:ext uri="{FF2B5EF4-FFF2-40B4-BE49-F238E27FC236}">
-                <a16:creationId xmlns:a16="http://schemas.microsoft.com/office/drawing/2014/main" id="{4F34C1B7-F0A6-439C-91F2-34A1FA1CEBCD}"/>
+                <a16:creationId xmlns:a16="http://schemas.microsoft.com/office/drawing/2014/main" id="{B38C006F-E9C0-4306-B266-A8FD4DDAC241}"/>
               </a:ext>
             </a:extLst>
           </p:cNvPr>
@@ -13807,8 +14432,218 @@
         </p:blipFill>
         <p:spPr>
           <a:xfrm>
-            <a:off x="8674601" y="5431559"/>
-            <a:ext cx="3061787" cy="1082584"/>
+            <a:off x="234114" y="3163279"/>
+            <a:ext cx="5461484" cy="1633310"/>
+          </a:xfrm>
+          <a:prstGeom prst="rect">
+            <a:avLst/>
+          </a:prstGeom>
+        </p:spPr>
+      </p:pic>
+      <p:sp>
+        <p:nvSpPr>
+          <p:cNvPr id="13" name="TextBox 12">
+            <a:extLst>
+              <a:ext uri="{FF2B5EF4-FFF2-40B4-BE49-F238E27FC236}">
+                <a16:creationId xmlns:a16="http://schemas.microsoft.com/office/drawing/2014/main" id="{B8A2AD42-9E31-4716-9974-A678E4536246}"/>
+              </a:ext>
+            </a:extLst>
+          </p:cNvPr>
+          <p:cNvSpPr txBox="1"/>
+          <p:nvPr/>
+        </p:nvSpPr>
+        <p:spPr>
+          <a:xfrm>
+            <a:off x="6096000" y="4853050"/>
+            <a:ext cx="3942850" cy="2400657"/>
+          </a:xfrm>
+          <a:prstGeom prst="rect">
+            <a:avLst/>
+          </a:prstGeom>
+          <a:noFill/>
+        </p:spPr>
+        <p:txBody>
+          <a:bodyPr wrap="square" rtlCol="0">
+            <a:spAutoFit/>
+          </a:bodyPr>
+          <a:lstStyle/>
+          <a:p>
+            <a:r>
+              <a:rPr lang="en-US" sz="1500" b="1" u="sng" dirty="0">
+                <a:solidFill>
+                  <a:schemeClr val="tx1">
+                    <a:lumMod val="95000"/>
+                  </a:schemeClr>
+                </a:solidFill>
+              </a:rPr>
+              <a:t>Confusion Matrix Results:</a:t>
+            </a:r>
+          </a:p>
+          <a:p>
+            <a:r>
+              <a:rPr lang="en-US" sz="1500" dirty="0">
+                <a:solidFill>
+                  <a:schemeClr val="tx1">
+                    <a:lumMod val="95000"/>
+                  </a:schemeClr>
+                </a:solidFill>
+              </a:rPr>
+              <a:t>• Overall, the total accuracy improves compared to the previous models (65%)</a:t>
+            </a:r>
+          </a:p>
+          <a:p>
+            <a:endParaRPr lang="en-US" sz="1500" dirty="0">
+              <a:solidFill>
+                <a:schemeClr val="tx1">
+                  <a:lumMod val="95000"/>
+                </a:schemeClr>
+              </a:solidFill>
+            </a:endParaRPr>
+          </a:p>
+          <a:p>
+            <a:r>
+              <a:rPr lang="en-US" sz="1500" dirty="0">
+                <a:solidFill>
+                  <a:schemeClr val="tx1">
+                    <a:lumMod val="95000"/>
+                  </a:schemeClr>
+                </a:solidFill>
+              </a:rPr>
+              <a:t>• Shorter term indicators capture also tend to improve the Sell signals (number of True Negatives slightly higher than False Negatives)</a:t>
+            </a:r>
+          </a:p>
+          <a:p>
+            <a:endParaRPr lang="en-US" sz="1500" dirty="0">
+              <a:solidFill>
+                <a:schemeClr val="tx1">
+                  <a:lumMod val="95000"/>
+                </a:schemeClr>
+              </a:solidFill>
+            </a:endParaRPr>
+          </a:p>
+          <a:p>
+            <a:endParaRPr lang="en-US" sz="1500" dirty="0"/>
+          </a:p>
+          <a:p>
+            <a:endParaRPr lang="en-US" sz="1500" dirty="0">
+              <a:solidFill>
+                <a:schemeClr val="tx1">
+                  <a:lumMod val="95000"/>
+                </a:schemeClr>
+              </a:solidFill>
+            </a:endParaRPr>
+          </a:p>
+        </p:txBody>
+      </p:sp>
+      <p:sp>
+        <p:nvSpPr>
+          <p:cNvPr id="15" name="TextBox 14">
+            <a:extLst>
+              <a:ext uri="{FF2B5EF4-FFF2-40B4-BE49-F238E27FC236}">
+                <a16:creationId xmlns:a16="http://schemas.microsoft.com/office/drawing/2014/main" id="{5D5A3701-BBC7-485D-BC4F-9DF688B2D880}"/>
+              </a:ext>
+            </a:extLst>
+          </p:cNvPr>
+          <p:cNvSpPr txBox="1"/>
+          <p:nvPr/>
+        </p:nvSpPr>
+        <p:spPr>
+          <a:xfrm>
+            <a:off x="5582651" y="1300588"/>
+            <a:ext cx="5767137" cy="1477328"/>
+          </a:xfrm>
+          <a:prstGeom prst="rect">
+            <a:avLst/>
+          </a:prstGeom>
+          <a:noFill/>
+        </p:spPr>
+        <p:txBody>
+          <a:bodyPr wrap="square" rtlCol="0">
+            <a:spAutoFit/>
+          </a:bodyPr>
+          <a:lstStyle/>
+          <a:p>
+            <a:r>
+              <a:rPr lang="en-US" sz="1500" dirty="0">
+                <a:solidFill>
+                  <a:schemeClr val="accent2">
+                    <a:lumMod val="75000"/>
+                  </a:schemeClr>
+                </a:solidFill>
+              </a:rPr>
+              <a:t>•</a:t>
+            </a:r>
+            <a:r>
+              <a:rPr lang="en-US" sz="1500" dirty="0">
+                <a:solidFill>
+                  <a:schemeClr val="tx1">
+                    <a:lumMod val="95000"/>
+                  </a:schemeClr>
+                </a:solidFill>
+              </a:rPr>
+              <a:t> </a:t>
+            </a:r>
+            <a:r>
+              <a:rPr lang="en-US" sz="1500" dirty="0">
+                <a:solidFill>
+                  <a:schemeClr val="accent2">
+                    <a:lumMod val="75000"/>
+                  </a:schemeClr>
+                </a:solidFill>
+              </a:rPr>
+              <a:t>Shorter term indicators used as inputs (shorter Moving Averages, correlation and Intraday data)</a:t>
+            </a:r>
+          </a:p>
+          <a:p>
+            <a:r>
+              <a:rPr lang="en-US" sz="1500" dirty="0">
+                <a:solidFill>
+                  <a:schemeClr val="accent2">
+                    <a:lumMod val="75000"/>
+                  </a:schemeClr>
+                </a:solidFill>
+              </a:rPr>
+              <a:t>• Different training/testing periods were used (shorter training/longer testing)</a:t>
+            </a:r>
+          </a:p>
+          <a:p>
+            <a:endParaRPr lang="en-US" sz="1500" dirty="0"/>
+          </a:p>
+          <a:p>
+            <a:endParaRPr lang="en-US" sz="1500" dirty="0">
+              <a:solidFill>
+                <a:schemeClr val="tx1">
+                  <a:lumMod val="95000"/>
+                </a:schemeClr>
+              </a:solidFill>
+            </a:endParaRPr>
+          </a:p>
+        </p:txBody>
+      </p:sp>
+      <p:pic>
+        <p:nvPicPr>
+          <p:cNvPr id="17" name="Picture 16">
+            <a:extLst>
+              <a:ext uri="{FF2B5EF4-FFF2-40B4-BE49-F238E27FC236}">
+                <a16:creationId xmlns:a16="http://schemas.microsoft.com/office/drawing/2014/main" id="{A7EFE361-8FAD-4DDD-B4A1-876B3F212C94}"/>
+              </a:ext>
+            </a:extLst>
+          </p:cNvPr>
+          <p:cNvPicPr>
+            <a:picLocks noChangeAspect="1"/>
+          </p:cNvPicPr>
+          <p:nvPr/>
+        </p:nvPicPr>
+        <p:blipFill>
+          <a:blip r:embed="rId5"/>
+          <a:stretch>
+            <a:fillRect/>
+          </a:stretch>
+        </p:blipFill>
+        <p:spPr>
+          <a:xfrm>
+            <a:off x="6156158" y="3156989"/>
+            <a:ext cx="4419600" cy="1633310"/>
           </a:xfrm>
           <a:prstGeom prst="rect">
             <a:avLst/>
@@ -13819,6 +14654,207 @@
     <p:extLst>
       <p:ext uri="{BB962C8B-B14F-4D97-AF65-F5344CB8AC3E}">
         <p14:creationId xmlns:p14="http://schemas.microsoft.com/office/powerpoint/2010/main" val="3527227421"/>
+      </p:ext>
+    </p:extLst>
+  </p:cSld>
+  <p:clrMapOvr>
+    <a:masterClrMapping/>
+  </p:clrMapOvr>
+</p:sld>
+</file>
+
+<file path=ppt/slides/slide7.xml><?xml version="1.0" encoding="utf-8"?>
+<p:sld xmlns:a="http://schemas.openxmlformats.org/drawingml/2006/main" xmlns:r="http://schemas.openxmlformats.org/officeDocument/2006/relationships" xmlns:p="http://schemas.openxmlformats.org/presentationml/2006/main">
+  <p:cSld>
+    <p:spTree>
+      <p:nvGrpSpPr>
+        <p:cNvPr id="1" name=""/>
+        <p:cNvGrpSpPr/>
+        <p:nvPr/>
+      </p:nvGrpSpPr>
+      <p:grpSpPr>
+        <a:xfrm>
+          <a:off x="0" y="0"/>
+          <a:ext cx="0" cy="0"/>
+          <a:chOff x="0" y="0"/>
+          <a:chExt cx="0" cy="0"/>
+        </a:xfrm>
+      </p:grpSpPr>
+      <p:sp>
+        <p:nvSpPr>
+          <p:cNvPr id="2" name="Title 1">
+            <a:extLst>
+              <a:ext uri="{FF2B5EF4-FFF2-40B4-BE49-F238E27FC236}">
+                <a16:creationId xmlns:a16="http://schemas.microsoft.com/office/drawing/2014/main" id="{FF377C37-494D-424E-BAE3-ADCBA2DFFF61}"/>
+              </a:ext>
+            </a:extLst>
+          </p:cNvPr>
+          <p:cNvSpPr>
+            <a:spLocks noGrp="1"/>
+          </p:cNvSpPr>
+          <p:nvPr>
+            <p:ph type="title"/>
+          </p:nvPr>
+        </p:nvSpPr>
+        <p:spPr>
+          <a:xfrm>
+            <a:off x="1141412" y="327514"/>
+            <a:ext cx="9905998" cy="1199445"/>
+          </a:xfrm>
+        </p:spPr>
+        <p:txBody>
+          <a:bodyPr/>
+          <a:lstStyle/>
+          <a:p>
+            <a:pPr algn="ctr"/>
+            <a:r>
+              <a:rPr lang="en-US" b="1" dirty="0"/>
+              <a:t>Promising, but….</a:t>
+            </a:r>
+            <a:endParaRPr lang="en-US" dirty="0"/>
+          </a:p>
+        </p:txBody>
+      </p:sp>
+      <p:sp>
+        <p:nvSpPr>
+          <p:cNvPr id="3" name="Content Placeholder 2">
+            <a:extLst>
+              <a:ext uri="{FF2B5EF4-FFF2-40B4-BE49-F238E27FC236}">
+                <a16:creationId xmlns:a16="http://schemas.microsoft.com/office/drawing/2014/main" id="{BA97A59D-0438-4967-9BE0-E79EBDEFE4E2}"/>
+              </a:ext>
+            </a:extLst>
+          </p:cNvPr>
+          <p:cNvSpPr>
+            <a:spLocks noGrp="1"/>
+          </p:cNvSpPr>
+          <p:nvPr>
+            <p:ph idx="1"/>
+          </p:nvPr>
+        </p:nvSpPr>
+        <p:spPr>
+          <a:xfrm>
+            <a:off x="1141412" y="1337491"/>
+            <a:ext cx="10017819" cy="4654235"/>
+          </a:xfrm>
+        </p:spPr>
+        <p:txBody>
+          <a:bodyPr>
+            <a:normAutofit/>
+          </a:bodyPr>
+          <a:lstStyle/>
+          <a:p>
+            <a:r>
+              <a:rPr lang="en-US" sz="1500" dirty="0">
+                <a:solidFill>
+                  <a:schemeClr val="accent2">
+                    <a:lumMod val="75000"/>
+                  </a:schemeClr>
+                </a:solidFill>
+              </a:rPr>
+              <a:t>While there seems to be some prediction capabilities using certain market data points, it is important to mention that before using such a model in a production environment, a full back test including transaction costs would be required.</a:t>
+            </a:r>
+          </a:p>
+          <a:p>
+            <a:r>
+              <a:rPr lang="en-US" sz="1500" dirty="0">
+                <a:solidFill>
+                  <a:schemeClr val="accent2">
+                    <a:lumMod val="75000"/>
+                  </a:schemeClr>
+                </a:solidFill>
+              </a:rPr>
+              <a:t>Models that worked using past data do not necessarily work in the future (markets constantly change…)</a:t>
+            </a:r>
+          </a:p>
+          <a:p>
+            <a:r>
+              <a:rPr lang="en-US" sz="1500" dirty="0">
+                <a:solidFill>
+                  <a:schemeClr val="accent2">
+                    <a:lumMod val="75000"/>
+                  </a:schemeClr>
+                </a:solidFill>
+              </a:rPr>
+              <a:t>The analysis revealed that Buy signals were generated with consistency. I would add a caveat to that given that markets have been in a significant up-trend since the lows of the global Financial Crisis back in 2009.</a:t>
+            </a:r>
+          </a:p>
+          <a:p>
+            <a:r>
+              <a:rPr lang="en-US" sz="1800" b="1" u="sng" dirty="0"/>
+              <a:t>Improvements:</a:t>
+            </a:r>
+            <a:endParaRPr lang="en-US" sz="1800" dirty="0"/>
+          </a:p>
+          <a:p>
+            <a:pPr lvl="1"/>
+            <a:r>
+              <a:rPr lang="en-US" sz="1500" dirty="0">
+                <a:solidFill>
+                  <a:schemeClr val="accent2">
+                    <a:lumMod val="75000"/>
+                  </a:schemeClr>
+                </a:solidFill>
+              </a:rPr>
+              <a:t>While there is some positive, more granular data would be needed (i.e. intraday data)</a:t>
+            </a:r>
+          </a:p>
+          <a:p>
+            <a:pPr lvl="1"/>
+            <a:r>
+              <a:rPr lang="en-US" sz="1500" dirty="0">
+                <a:solidFill>
+                  <a:schemeClr val="accent2">
+                    <a:lumMod val="75000"/>
+                  </a:schemeClr>
+                </a:solidFill>
+              </a:rPr>
+              <a:t>Imagination is the limit, new data sets could be used and combined to produce alpha </a:t>
+            </a:r>
+          </a:p>
+          <a:p>
+            <a:pPr lvl="1"/>
+            <a:r>
+              <a:rPr lang="en-US" sz="1500" dirty="0">
+                <a:solidFill>
+                  <a:schemeClr val="accent2">
+                    <a:lumMod val="75000"/>
+                  </a:schemeClr>
+                </a:solidFill>
+              </a:rPr>
+              <a:t>Finally, training a Neural Network would be worth testing.</a:t>
+            </a:r>
+          </a:p>
+          <a:p>
+            <a:pPr lvl="1"/>
+            <a:endParaRPr lang="en-US" dirty="0">
+              <a:solidFill>
+                <a:schemeClr val="accent2">
+                  <a:lumMod val="75000"/>
+                </a:schemeClr>
+              </a:solidFill>
+            </a:endParaRPr>
+          </a:p>
+          <a:p>
+            <a:pPr marL="457200" lvl="1" indent="0">
+              <a:buNone/>
+            </a:pPr>
+            <a:endParaRPr lang="en-US" dirty="0">
+              <a:solidFill>
+                <a:schemeClr val="tx2">
+                  <a:lumMod val="75000"/>
+                </a:schemeClr>
+              </a:solidFill>
+            </a:endParaRPr>
+          </a:p>
+          <a:p>
+            <a:endParaRPr lang="en-US" dirty="0"/>
+          </a:p>
+        </p:txBody>
+      </p:sp>
+    </p:spTree>
+    <p:extLst>
+      <p:ext uri="{BB962C8B-B14F-4D97-AF65-F5344CB8AC3E}">
+        <p14:creationId xmlns:p14="http://schemas.microsoft.com/office/powerpoint/2010/main" val="2972374305"/>
       </p:ext>
     </p:extLst>
   </p:cSld>

</xml_diff>